<commit_message>
update references and readme
</commit_message>
<xml_diff>
--- a/updates/Weijiang Xiong project presentation.pptx
+++ b/updates/Weijiang Xiong project presentation.pptx
@@ -5,10 +5,10 @@
     <p:sldMasterId id="2147483648" r:id="rId1"/>
   </p:sldMasterIdLst>
   <p:notesMasterIdLst>
-    <p:notesMasterId r:id="rId16"/>
+    <p:notesMasterId r:id="rId17"/>
   </p:notesMasterIdLst>
   <p:handoutMasterIdLst>
-    <p:handoutMasterId r:id="rId17"/>
+    <p:handoutMasterId r:id="rId18"/>
   </p:handoutMasterIdLst>
   <p:sldIdLst>
     <p:sldId id="256" r:id="rId2"/>
@@ -25,6 +25,7 @@
     <p:sldId id="345" r:id="rId13"/>
     <p:sldId id="352" r:id="rId14"/>
     <p:sldId id="351" r:id="rId15"/>
+    <p:sldId id="358" r:id="rId16"/>
   </p:sldIdLst>
   <p:sldSz cx="12192000" cy="6858000"/>
   <p:notesSz cx="6858000" cy="9144000"/>
@@ -667,7 +668,7 @@
           <a:p>
             <a:fld id="{15CBCB9E-4686-42C2-8C94-4194A3E02D2B}" type="datetimeFigureOut">
               <a:rPr lang="zh-CN" altLang="en-US" smtClean="0"/>
-              <a:t>2021/8/23</a:t>
+              <a:t>2021/9/26</a:t>
             </a:fld>
             <a:endParaRPr lang="zh-CN" altLang="en-US"/>
           </a:p>
@@ -845,7 +846,7 @@
           <a:p>
             <a:fld id="{DAF7020D-062E-41BC-A699-A7B3427D8CC2}" type="datetimeFigureOut">
               <a:rPr lang="zh-CN" altLang="en-US" smtClean="0"/>
-              <a:t>2021/8/23</a:t>
+              <a:t>2021/9/26</a:t>
             </a:fld>
             <a:endParaRPr lang="zh-CN" altLang="en-US"/>
           </a:p>
@@ -1846,6 +1847,90 @@
 </p:notes>
 </file>
 
+<file path=ppt/notesSlides/notesSlide15.xml><?xml version="1.0" encoding="utf-8"?>
+<p:notes xmlns:a="http://schemas.openxmlformats.org/drawingml/2006/main" xmlns:r="http://schemas.openxmlformats.org/officeDocument/2006/relationships" xmlns:p="http://schemas.openxmlformats.org/presentationml/2006/main">
+  <p:cSld>
+    <p:spTree>
+      <p:nvGrpSpPr>
+        <p:cNvPr id="1" name=""/>
+        <p:cNvGrpSpPr/>
+        <p:nvPr/>
+      </p:nvGrpSpPr>
+      <p:grpSpPr>
+        <a:xfrm>
+          <a:off x="0" y="0"/>
+          <a:ext cx="0" cy="0"/>
+          <a:chOff x="0" y="0"/>
+          <a:chExt cx="0" cy="0"/>
+        </a:xfrm>
+      </p:grpSpPr>
+      <p:sp>
+        <p:nvSpPr>
+          <p:cNvPr id="2" name="Slide Image Placeholder 1"/>
+          <p:cNvSpPr>
+            <a:spLocks noGrp="1" noRot="1" noChangeAspect="1"/>
+          </p:cNvSpPr>
+          <p:nvPr>
+            <p:ph type="sldImg"/>
+          </p:nvPr>
+        </p:nvSpPr>
+        <p:spPr/>
+      </p:sp>
+      <p:sp>
+        <p:nvSpPr>
+          <p:cNvPr id="3" name="Notes Placeholder 2"/>
+          <p:cNvSpPr>
+            <a:spLocks noGrp="1"/>
+          </p:cNvSpPr>
+          <p:nvPr>
+            <p:ph type="body" idx="1"/>
+          </p:nvPr>
+        </p:nvSpPr>
+        <p:spPr/>
+        <p:txBody>
+          <a:bodyPr/>
+          <a:lstStyle/>
+          <a:p>
+            <a:endParaRPr lang="zh-CN" altLang="en-US"/>
+          </a:p>
+        </p:txBody>
+      </p:sp>
+      <p:sp>
+        <p:nvSpPr>
+          <p:cNvPr id="4" name="Slide Number Placeholder 3"/>
+          <p:cNvSpPr>
+            <a:spLocks noGrp="1"/>
+          </p:cNvSpPr>
+          <p:nvPr>
+            <p:ph type="sldNum" sz="quarter" idx="5"/>
+          </p:nvPr>
+        </p:nvSpPr>
+        <p:spPr/>
+        <p:txBody>
+          <a:bodyPr/>
+          <a:lstStyle/>
+          <a:p>
+            <a:fld id="{85A48CC1-E4FE-424E-8EC0-F8635A798222}" type="slidenum">
+              <a:rPr lang="zh-CN" altLang="en-US" smtClean="0"/>
+              <a:t>14</a:t>
+            </a:fld>
+            <a:endParaRPr lang="zh-CN" altLang="en-US"/>
+          </a:p>
+        </p:txBody>
+      </p:sp>
+    </p:spTree>
+    <p:extLst>
+      <p:ext uri="{BB962C8B-B14F-4D97-AF65-F5344CB8AC3E}">
+        <p14:creationId xmlns:p14="http://schemas.microsoft.com/office/powerpoint/2010/main" val="1272382871"/>
+      </p:ext>
+    </p:extLst>
+  </p:cSld>
+  <p:clrMapOvr>
+    <a:masterClrMapping/>
+  </p:clrMapOvr>
+</p:notes>
+</file>
+
 <file path=ppt/notesSlides/notesSlide2.xml><?xml version="1.0" encoding="utf-8"?>
 <p:notes xmlns:a="http://schemas.openxmlformats.org/drawingml/2006/main" xmlns:r="http://schemas.openxmlformats.org/officeDocument/2006/relationships" xmlns:p="http://schemas.openxmlformats.org/presentationml/2006/main">
   <p:cSld>
@@ -3407,7 +3492,7 @@
           <a:p>
             <a:fld id="{FDA7BBC4-C20C-4DC2-85FC-7542E9B4035C}" type="datetime1">
               <a:rPr lang="zh-CN" altLang="en-US" smtClean="0"/>
-              <a:t>2021/8/23</a:t>
+              <a:t>2021/9/26</a:t>
             </a:fld>
             <a:endParaRPr lang="zh-CN" altLang="en-US"/>
           </a:p>
@@ -3723,7 +3808,7 @@
           <a:p>
             <a:fld id="{7DB53480-03FD-474D-81D5-91A493E36782}" type="datetime1">
               <a:rPr lang="zh-CN" altLang="en-US" smtClean="0"/>
-              <a:t>2021/8/23</a:t>
+              <a:t>2021/9/26</a:t>
             </a:fld>
             <a:endParaRPr lang="zh-CN" altLang="en-US"/>
           </a:p>
@@ -4015,7 +4100,7 @@
           <a:p>
             <a:fld id="{F3EB354F-D580-4E3D-ACC0-30A1D2CF46DB}" type="datetime1">
               <a:rPr lang="zh-CN" altLang="en-US" smtClean="0"/>
-              <a:t>2021/8/23</a:t>
+              <a:t>2021/9/26</a:t>
             </a:fld>
             <a:endParaRPr lang="zh-CN" altLang="en-US"/>
           </a:p>
@@ -4217,7 +4302,7 @@
           <a:p>
             <a:fld id="{DCAB734D-ABA4-48B6-AF00-5C142D47BA5E}" type="datetime1">
               <a:rPr lang="zh-CN" altLang="en-US" smtClean="0"/>
-              <a:t>2021/8/23</a:t>
+              <a:t>2021/9/26</a:t>
             </a:fld>
             <a:endParaRPr lang="zh-CN" altLang="en-US"/>
           </a:p>
@@ -4429,7 +4514,7 @@
           <a:p>
             <a:fld id="{03B4829F-A876-4F06-84B6-B5A7172BA216}" type="datetime1">
               <a:rPr lang="zh-CN" altLang="en-US" smtClean="0"/>
-              <a:t>2021/8/23</a:t>
+              <a:t>2021/9/26</a:t>
             </a:fld>
             <a:endParaRPr lang="zh-CN" altLang="en-US"/>
           </a:p>
@@ -4758,7 +4843,7 @@
           <a:p>
             <a:fld id="{A9D4E5CD-53C1-4986-ABF3-7CC6C5A812B2}" type="datetime1">
               <a:rPr lang="zh-CN" altLang="en-US" smtClean="0"/>
-              <a:t>2021/8/23</a:t>
+              <a:t>2021/9/26</a:t>
             </a:fld>
             <a:endParaRPr lang="zh-CN" altLang="en-US"/>
           </a:p>
@@ -5193,7 +5278,7 @@
           <a:p>
             <a:fld id="{3C591787-9F1E-44C3-A5C9-1613129471FF}" type="datetime1">
               <a:rPr lang="zh-CN" altLang="en-US" smtClean="0"/>
-              <a:t>2021/8/23</a:t>
+              <a:t>2021/9/26</a:t>
             </a:fld>
             <a:endParaRPr lang="zh-CN" altLang="en-US"/>
           </a:p>
@@ -5523,7 +5608,7 @@
           <a:p>
             <a:fld id="{74E18AE1-31A0-407A-9E44-16B34D3C3FF2}" type="datetime1">
               <a:rPr lang="zh-CN" altLang="en-US" smtClean="0"/>
-              <a:t>2021/8/23</a:t>
+              <a:t>2021/9/26</a:t>
             </a:fld>
             <a:endParaRPr lang="zh-CN" altLang="en-US"/>
           </a:p>
@@ -5803,7 +5888,7 @@
           <a:p>
             <a:fld id="{3C439B68-7DDA-4637-BF59-2C26A322B454}" type="datetime1">
               <a:rPr lang="zh-CN" altLang="en-US" smtClean="0"/>
-              <a:t>2021/8/23</a:t>
+              <a:t>2021/9/26</a:t>
             </a:fld>
             <a:endParaRPr lang="zh-CN" altLang="en-US"/>
           </a:p>
@@ -6073,7 +6158,7 @@
           <a:p>
             <a:fld id="{B04FB9DF-51A1-404F-BE9E-C32B537F8EB9}" type="datetime1">
               <a:rPr lang="zh-CN" altLang="en-US" smtClean="0"/>
-              <a:t>2021/8/23</a:t>
+              <a:t>2021/9/26</a:t>
             </a:fld>
             <a:endParaRPr lang="zh-CN" altLang="en-US"/>
           </a:p>
@@ -6489,7 +6574,7 @@
           <a:p>
             <a:fld id="{71A58C49-3C8A-4C09-AB79-6221C1E0392D}" type="datetime1">
               <a:rPr lang="zh-CN" altLang="en-US" smtClean="0"/>
-              <a:t>2021/8/23</a:t>
+              <a:t>2021/9/26</a:t>
             </a:fld>
             <a:endParaRPr lang="zh-CN" altLang="en-US"/>
           </a:p>
@@ -6634,7 +6719,7 @@
           <a:p>
             <a:fld id="{88D56FE7-DD25-4CC0-AD68-ABBC3EDE9213}" type="datetime1">
               <a:rPr lang="zh-CN" altLang="en-US" smtClean="0"/>
-              <a:t>2021/8/23</a:t>
+              <a:t>2021/9/26</a:t>
             </a:fld>
             <a:endParaRPr lang="zh-CN" altLang="en-US"/>
           </a:p>
@@ -6751,7 +6836,7 @@
           <a:p>
             <a:fld id="{CFF9322F-E466-41DF-86D8-4270B67D9A63}" type="datetime1">
               <a:rPr lang="zh-CN" altLang="en-US" smtClean="0"/>
-              <a:t>2021/8/23</a:t>
+              <a:t>2021/9/26</a:t>
             </a:fld>
             <a:endParaRPr lang="zh-CN" altLang="en-US"/>
           </a:p>
@@ -6996,7 +7081,7 @@
           <a:p>
             <a:fld id="{42D887FC-E8D4-4ACC-8C0D-D6D3E5772C5A}" type="datetime1">
               <a:rPr lang="zh-CN" altLang="en-US" smtClean="0"/>
-              <a:t>2021/8/23</a:t>
+              <a:t>2021/9/26</a:t>
             </a:fld>
             <a:endParaRPr lang="zh-CN" altLang="en-US"/>
           </a:p>
@@ -7893,7 +7978,7 @@
           <a:p>
             <a:fld id="{7759A32C-784D-4C90-A57A-523B08FB85CB}" type="datetime1">
               <a:rPr lang="zh-CN" altLang="en-US" smtClean="0"/>
-              <a:t>2021/8/24</a:t>
+              <a:t>2021/9/26</a:t>
             </a:fld>
             <a:endParaRPr lang="zh-CN" altLang="en-US"/>
           </a:p>
@@ -8996,7 +9081,7 @@
           <a:p>
             <a:fld id="{7759A32C-784D-4C90-A57A-523B08FB85CB}" type="datetime1">
               <a:rPr lang="zh-CN" altLang="en-US" smtClean="0"/>
-              <a:t>2021/8/24</a:t>
+              <a:t>2021/9/26</a:t>
             </a:fld>
             <a:endParaRPr lang="zh-CN" altLang="en-US"/>
           </a:p>
@@ -9668,7 +9753,7 @@
           <a:p>
             <a:fld id="{17D7ABD8-C23A-47F3-BE82-007AEC46A0FB}" type="datetime1">
               <a:rPr lang="zh-CN" altLang="en-US" smtClean="0"/>
-              <a:t>2021/8/24</a:t>
+              <a:t>2021/9/26</a:t>
             </a:fld>
             <a:endParaRPr lang="zh-CN" altLang="en-US"/>
           </a:p>
@@ -9733,8 +9818,8 @@
           </a:p>
         </p:txBody>
       </p:sp>
-      <mc:AlternateContent xmlns:mc="http://schemas.openxmlformats.org/markup-compatibility/2006">
-        <mc:Choice xmlns:a14="http://schemas.microsoft.com/office/drawing/2010/main" Requires="a14">
+      <mc:AlternateContent xmlns:mc="http://schemas.openxmlformats.org/markup-compatibility/2006" xmlns:a14="http://schemas.microsoft.com/office/drawing/2010/main">
+        <mc:Choice Requires="a14">
           <p:sp>
             <p:nvSpPr>
               <p:cNvPr id="10" name="TextBox 9">
@@ -9841,7 +9926,7 @@
             </p:txBody>
           </p:sp>
         </mc:Choice>
-        <mc:Fallback>
+        <mc:Fallback xmlns="">
           <p:sp>
             <p:nvSpPr>
               <p:cNvPr id="10" name="TextBox 9">
@@ -10046,8 +10131,8 @@
           <a:p>
             <a:pPr lvl="1"/>
             <a:r>
-              <a:rPr lang="en-US" altLang="zh-CN" dirty="0"/>
-              <a:t>FashionMnist: </a:t>
+              <a:rPr lang="en-US" altLang="zh-CN"/>
+              <a:t>FashionMnist : </a:t>
             </a:r>
             <a:r>
               <a:rPr lang="en-US" altLang="zh-CN" dirty="0">
@@ -10261,6 +10346,174 @@
               <a:t>, Normal</a:t>
             </a:r>
             <a:endParaRPr lang="zh-CN" altLang="en-US"/>
+          </a:p>
+        </p:txBody>
+      </p:sp>
+      <p:sp>
+        <p:nvSpPr>
+          <p:cNvPr id="18" name="TextBox 17">
+            <a:extLst>
+              <a:ext uri="{FF2B5EF4-FFF2-40B4-BE49-F238E27FC236}">
+                <a16:creationId xmlns:a16="http://schemas.microsoft.com/office/drawing/2014/main" id="{B600B3BE-210B-4CDD-8BE8-BE7CC8DA3CFA}"/>
+              </a:ext>
+            </a:extLst>
+          </p:cNvPr>
+          <p:cNvSpPr txBox="1"/>
+          <p:nvPr/>
+        </p:nvSpPr>
+        <p:spPr>
+          <a:xfrm>
+            <a:off x="2113280" y="3927232"/>
+            <a:ext cx="1631869" cy="276999"/>
+          </a:xfrm>
+          <a:prstGeom prst="rect">
+            <a:avLst/>
+          </a:prstGeom>
+          <a:noFill/>
+        </p:spPr>
+        <p:txBody>
+          <a:bodyPr wrap="square">
+            <a:spAutoFit/>
+          </a:bodyPr>
+          <a:lstStyle/>
+          <a:p>
+            <a:r>
+              <a:rPr lang="en-US" altLang="zh-CN" sz="1200">
+                <a:solidFill>
+                  <a:srgbClr val="FF0000"/>
+                </a:solidFill>
+              </a:rPr>
+              <a:t>FashionMnist Baseline</a:t>
+            </a:r>
+            <a:endParaRPr lang="zh-CN" altLang="en-US" sz="1200">
+              <a:solidFill>
+                <a:srgbClr val="FF0000"/>
+              </a:solidFill>
+            </a:endParaRPr>
+          </a:p>
+        </p:txBody>
+      </p:sp>
+      <p:sp>
+        <p:nvSpPr>
+          <p:cNvPr id="23" name="TextBox 22">
+            <a:extLst>
+              <a:ext uri="{FF2B5EF4-FFF2-40B4-BE49-F238E27FC236}">
+                <a16:creationId xmlns:a16="http://schemas.microsoft.com/office/drawing/2014/main" id="{021DAD5A-E3FF-448A-BDC5-B710582A189B}"/>
+              </a:ext>
+            </a:extLst>
+          </p:cNvPr>
+          <p:cNvSpPr txBox="1"/>
+          <p:nvPr/>
+        </p:nvSpPr>
+        <p:spPr>
+          <a:xfrm>
+            <a:off x="694232" y="5085387"/>
+            <a:ext cx="1631869" cy="276999"/>
+          </a:xfrm>
+          <a:prstGeom prst="rect">
+            <a:avLst/>
+          </a:prstGeom>
+          <a:noFill/>
+        </p:spPr>
+        <p:txBody>
+          <a:bodyPr wrap="square">
+            <a:spAutoFit/>
+          </a:bodyPr>
+          <a:lstStyle/>
+          <a:p>
+            <a:r>
+              <a:rPr lang="en-US" altLang="zh-CN" sz="1200">
+                <a:solidFill>
+                  <a:schemeClr val="accent1"/>
+                </a:solidFill>
+              </a:rPr>
+              <a:t>CIFAR10 Baseline</a:t>
+            </a:r>
+            <a:endParaRPr lang="zh-CN" altLang="en-US" sz="1200">
+              <a:solidFill>
+                <a:schemeClr val="accent1"/>
+              </a:solidFill>
+            </a:endParaRPr>
+          </a:p>
+        </p:txBody>
+      </p:sp>
+      <p:sp>
+        <p:nvSpPr>
+          <p:cNvPr id="24" name="TextBox 23">
+            <a:extLst>
+              <a:ext uri="{FF2B5EF4-FFF2-40B4-BE49-F238E27FC236}">
+                <a16:creationId xmlns:a16="http://schemas.microsoft.com/office/drawing/2014/main" id="{914B906C-0A06-4556-832A-B55739D47187}"/>
+              </a:ext>
+            </a:extLst>
+          </p:cNvPr>
+          <p:cNvSpPr txBox="1"/>
+          <p:nvPr/>
+        </p:nvSpPr>
+        <p:spPr>
+          <a:xfrm>
+            <a:off x="5715000" y="5189109"/>
+            <a:ext cx="1631869" cy="276999"/>
+          </a:xfrm>
+          <a:prstGeom prst="rect">
+            <a:avLst/>
+          </a:prstGeom>
+          <a:noFill/>
+        </p:spPr>
+        <p:txBody>
+          <a:bodyPr wrap="square">
+            <a:spAutoFit/>
+          </a:bodyPr>
+          <a:lstStyle/>
+          <a:p>
+            <a:r>
+              <a:rPr lang="en-US" altLang="zh-CN" sz="1200">
+                <a:solidFill>
+                  <a:srgbClr val="7030A0"/>
+                </a:solidFill>
+              </a:rPr>
+              <a:t>LeNet Dropout</a:t>
+            </a:r>
+            <a:endParaRPr lang="zh-CN" altLang="en-US" sz="1200">
+              <a:solidFill>
+                <a:srgbClr val="7030A0"/>
+              </a:solidFill>
+            </a:endParaRPr>
+          </a:p>
+        </p:txBody>
+      </p:sp>
+      <p:sp>
+        <p:nvSpPr>
+          <p:cNvPr id="25" name="TextBox 24">
+            <a:extLst>
+              <a:ext uri="{FF2B5EF4-FFF2-40B4-BE49-F238E27FC236}">
+                <a16:creationId xmlns:a16="http://schemas.microsoft.com/office/drawing/2014/main" id="{EC74B446-28D5-4A82-93AC-E840C8AAAAB5}"/>
+              </a:ext>
+            </a:extLst>
+          </p:cNvPr>
+          <p:cNvSpPr txBox="1"/>
+          <p:nvPr/>
+        </p:nvSpPr>
+        <p:spPr>
+          <a:xfrm>
+            <a:off x="5847080" y="5789273"/>
+            <a:ext cx="1631869" cy="276999"/>
+          </a:xfrm>
+          <a:prstGeom prst="rect">
+            <a:avLst/>
+          </a:prstGeom>
+          <a:noFill/>
+        </p:spPr>
+        <p:txBody>
+          <a:bodyPr wrap="square">
+            <a:spAutoFit/>
+          </a:bodyPr>
+          <a:lstStyle/>
+          <a:p>
+            <a:r>
+              <a:rPr lang="en-US" altLang="zh-CN" sz="1200"/>
+              <a:t>Baseline</a:t>
+            </a:r>
+            <a:endParaRPr lang="zh-CN" altLang="en-US" sz="1200"/>
           </a:p>
         </p:txBody>
       </p:sp>
@@ -10870,7 +11123,7 @@
           <a:p>
             <a:fld id="{17D7ABD8-C23A-47F3-BE82-007AEC46A0FB}" type="datetime1">
               <a:rPr lang="zh-CN" altLang="en-US" smtClean="0"/>
-              <a:t>2021/8/24</a:t>
+              <a:t>2021/9/26</a:t>
             </a:fld>
             <a:endParaRPr lang="zh-CN" altLang="en-US"/>
           </a:p>
@@ -11071,8 +11324,8 @@
           </a:p>
         </p:txBody>
       </p:sp>
-      <mc:AlternateContent xmlns:mc="http://schemas.openxmlformats.org/markup-compatibility/2006">
-        <mc:Choice xmlns:a14="http://schemas.microsoft.com/office/drawing/2010/main" Requires="a14">
+      <mc:AlternateContent xmlns:mc="http://schemas.openxmlformats.org/markup-compatibility/2006" xmlns:a14="http://schemas.microsoft.com/office/drawing/2010/main">
+        <mc:Choice Requires="a14">
           <p:sp>
             <p:nvSpPr>
               <p:cNvPr id="20" name="TextBox 19">
@@ -11179,7 +11432,7 @@
             </p:txBody>
           </p:sp>
         </mc:Choice>
-        <mc:Fallback>
+        <mc:Fallback xmlns="">
           <p:sp>
             <p:nvSpPr>
               <p:cNvPr id="20" name="TextBox 19">
@@ -11269,6 +11522,86 @@
           </a:fontRef>
         </p:style>
       </p:cxnSp>
+      <p:sp>
+        <p:nvSpPr>
+          <p:cNvPr id="13" name="TextBox 12">
+            <a:extLst>
+              <a:ext uri="{FF2B5EF4-FFF2-40B4-BE49-F238E27FC236}">
+                <a16:creationId xmlns:a16="http://schemas.microsoft.com/office/drawing/2014/main" id="{0BB9C779-2740-4342-9832-A0A023029701}"/>
+              </a:ext>
+            </a:extLst>
+          </p:cNvPr>
+          <p:cNvSpPr txBox="1"/>
+          <p:nvPr/>
+        </p:nvSpPr>
+        <p:spPr>
+          <a:xfrm>
+            <a:off x="2676496" y="4202799"/>
+            <a:ext cx="1631869" cy="276999"/>
+          </a:xfrm>
+          <a:prstGeom prst="rect">
+            <a:avLst/>
+          </a:prstGeom>
+          <a:noFill/>
+        </p:spPr>
+        <p:txBody>
+          <a:bodyPr wrap="square">
+            <a:spAutoFit/>
+          </a:bodyPr>
+          <a:lstStyle/>
+          <a:p>
+            <a:r>
+              <a:rPr lang="en-US" altLang="zh-CN" sz="1200">
+                <a:solidFill>
+                  <a:srgbClr val="C00000"/>
+                </a:solidFill>
+              </a:rPr>
+              <a:t>Baseline</a:t>
+            </a:r>
+            <a:endParaRPr lang="zh-CN" altLang="en-US" sz="1200">
+              <a:solidFill>
+                <a:srgbClr val="C00000"/>
+              </a:solidFill>
+            </a:endParaRPr>
+          </a:p>
+        </p:txBody>
+      </p:sp>
+      <p:sp>
+        <p:nvSpPr>
+          <p:cNvPr id="14" name="TextBox 13">
+            <a:extLst>
+              <a:ext uri="{FF2B5EF4-FFF2-40B4-BE49-F238E27FC236}">
+                <a16:creationId xmlns:a16="http://schemas.microsoft.com/office/drawing/2014/main" id="{BA7EA779-BBA7-41A7-B94D-68B579815ED7}"/>
+              </a:ext>
+            </a:extLst>
+          </p:cNvPr>
+          <p:cNvSpPr txBox="1"/>
+          <p:nvPr/>
+        </p:nvSpPr>
+        <p:spPr>
+          <a:xfrm>
+            <a:off x="4728313" y="4086800"/>
+            <a:ext cx="1631869" cy="276999"/>
+          </a:xfrm>
+          <a:prstGeom prst="rect">
+            <a:avLst/>
+          </a:prstGeom>
+          <a:noFill/>
+        </p:spPr>
+        <p:txBody>
+          <a:bodyPr wrap="square">
+            <a:spAutoFit/>
+          </a:bodyPr>
+          <a:lstStyle/>
+          <a:p>
+            <a:r>
+              <a:rPr lang="en-US" altLang="zh-CN" sz="1200"/>
+              <a:t>Baseline</a:t>
+            </a:r>
+            <a:endParaRPr lang="zh-CN" altLang="en-US" sz="1200"/>
+          </a:p>
+        </p:txBody>
+      </p:sp>
     </p:spTree>
     <p:extLst>
       <p:ext uri="{BB962C8B-B14F-4D97-AF65-F5344CB8AC3E}">
@@ -11433,7 +11766,7 @@
           <a:p>
             <a:fld id="{7759A32C-784D-4C90-A57A-523B08FB85CB}" type="datetime1">
               <a:rPr lang="zh-CN" altLang="en-US" smtClean="0"/>
-              <a:t>2021/8/24</a:t>
+              <a:t>2021/9/26</a:t>
             </a:fld>
             <a:endParaRPr lang="zh-CN" altLang="en-US"/>
           </a:p>
@@ -12175,6 +12508,2411 @@
 </p:sld>
 </file>
 
+<file path=ppt/slides/slide15.xml><?xml version="1.0" encoding="utf-8"?>
+<p:sld xmlns:a="http://schemas.openxmlformats.org/drawingml/2006/main" xmlns:r="http://schemas.openxmlformats.org/officeDocument/2006/relationships" xmlns:p="http://schemas.openxmlformats.org/presentationml/2006/main">
+  <p:cSld>
+    <p:spTree>
+      <p:nvGrpSpPr>
+        <p:cNvPr id="1" name=""/>
+        <p:cNvGrpSpPr/>
+        <p:nvPr/>
+      </p:nvGrpSpPr>
+      <p:grpSpPr>
+        <a:xfrm>
+          <a:off x="0" y="0"/>
+          <a:ext cx="0" cy="0"/>
+          <a:chOff x="0" y="0"/>
+          <a:chExt cx="0" cy="0"/>
+        </a:xfrm>
+      </p:grpSpPr>
+      <p:sp>
+        <p:nvSpPr>
+          <p:cNvPr id="2" name="Title 1">
+            <a:extLst>
+              <a:ext uri="{FF2B5EF4-FFF2-40B4-BE49-F238E27FC236}">
+                <a16:creationId xmlns:a16="http://schemas.microsoft.com/office/drawing/2014/main" id="{2D7C3D9F-E802-4823-9B6C-284F36FAF5EF}"/>
+              </a:ext>
+            </a:extLst>
+          </p:cNvPr>
+          <p:cNvSpPr>
+            <a:spLocks noGrp="1"/>
+          </p:cNvSpPr>
+          <p:nvPr>
+            <p:ph type="title"/>
+          </p:nvPr>
+        </p:nvSpPr>
+        <p:spPr>
+          <a:xfrm>
+            <a:off x="336000" y="261110"/>
+            <a:ext cx="4863529" cy="504001"/>
+          </a:xfrm>
+        </p:spPr>
+        <p:txBody>
+          <a:bodyPr>
+            <a:normAutofit/>
+          </a:bodyPr>
+          <a:lstStyle/>
+          <a:p>
+            <a:r>
+              <a:rPr lang="en-US" altLang="zh-CN"/>
+              <a:t>Drawings</a:t>
+            </a:r>
+            <a:endParaRPr lang="zh-CN" altLang="en-US"/>
+          </a:p>
+        </p:txBody>
+      </p:sp>
+      <p:sp>
+        <p:nvSpPr>
+          <p:cNvPr id="3" name="Date Placeholder 2">
+            <a:extLst>
+              <a:ext uri="{FF2B5EF4-FFF2-40B4-BE49-F238E27FC236}">
+                <a16:creationId xmlns:a16="http://schemas.microsoft.com/office/drawing/2014/main" id="{98C656CF-2EDD-47EB-8563-2B1816D56178}"/>
+              </a:ext>
+            </a:extLst>
+          </p:cNvPr>
+          <p:cNvSpPr>
+            <a:spLocks noGrp="1"/>
+          </p:cNvSpPr>
+          <p:nvPr>
+            <p:ph type="dt" sz="half" idx="10"/>
+          </p:nvPr>
+        </p:nvSpPr>
+        <p:spPr/>
+        <p:txBody>
+          <a:bodyPr/>
+          <a:lstStyle/>
+          <a:p>
+            <a:fld id="{7759A32C-784D-4C90-A57A-523B08FB85CB}" type="datetime1">
+              <a:rPr lang="zh-CN" altLang="en-US" smtClean="0"/>
+              <a:t>2021/9/26</a:t>
+            </a:fld>
+            <a:endParaRPr lang="zh-CN" altLang="en-US"/>
+          </a:p>
+        </p:txBody>
+      </p:sp>
+      <p:sp>
+        <p:nvSpPr>
+          <p:cNvPr id="4" name="Footer Placeholder 3">
+            <a:extLst>
+              <a:ext uri="{FF2B5EF4-FFF2-40B4-BE49-F238E27FC236}">
+                <a16:creationId xmlns:a16="http://schemas.microsoft.com/office/drawing/2014/main" id="{CDF42937-01A2-48C5-8270-2D1B6C835197}"/>
+              </a:ext>
+            </a:extLst>
+          </p:cNvPr>
+          <p:cNvSpPr>
+            <a:spLocks noGrp="1"/>
+          </p:cNvSpPr>
+          <p:nvPr>
+            <p:ph type="ftr" sz="quarter" idx="11"/>
+          </p:nvPr>
+        </p:nvSpPr>
+        <p:spPr/>
+        <p:txBody>
+          <a:bodyPr/>
+          <a:lstStyle/>
+          <a:p>
+            <a:r>
+              <a:rPr lang="en-US" altLang="zh-CN" dirty="0"/>
+              <a:t>Normalizing Flows for Implicit BNN</a:t>
+            </a:r>
+            <a:endParaRPr lang="zh-CN" altLang="en-US"/>
+          </a:p>
+        </p:txBody>
+      </p:sp>
+      <p:sp>
+        <p:nvSpPr>
+          <p:cNvPr id="6" name="Slide Number Placeholder 5">
+            <a:extLst>
+              <a:ext uri="{FF2B5EF4-FFF2-40B4-BE49-F238E27FC236}">
+                <a16:creationId xmlns:a16="http://schemas.microsoft.com/office/drawing/2014/main" id="{B26C03E4-36A9-498B-A751-F37BE1E6AC5A}"/>
+              </a:ext>
+            </a:extLst>
+          </p:cNvPr>
+          <p:cNvSpPr>
+            <a:spLocks noGrp="1"/>
+          </p:cNvSpPr>
+          <p:nvPr>
+            <p:ph type="sldNum" sz="quarter" idx="12"/>
+          </p:nvPr>
+        </p:nvSpPr>
+        <p:spPr>
+          <a:xfrm>
+            <a:off x="8610600" y="6331036"/>
+            <a:ext cx="2743200" cy="365125"/>
+          </a:xfrm>
+        </p:spPr>
+        <p:txBody>
+          <a:bodyPr/>
+          <a:lstStyle/>
+          <a:p>
+            <a:fld id="{B6EE4CE8-67DD-4AAC-82D8-3F81517F6647}" type="slidenum">
+              <a:rPr lang="zh-CN" altLang="en-US" smtClean="0"/>
+              <a:pPr/>
+              <a:t>14</a:t>
+            </a:fld>
+            <a:endParaRPr lang="zh-CN" altLang="en-US"/>
+          </a:p>
+        </p:txBody>
+      </p:sp>
+      <p:grpSp>
+        <p:nvGrpSpPr>
+          <p:cNvPr id="16" name="Group 15">
+            <a:extLst>
+              <a:ext uri="{FF2B5EF4-FFF2-40B4-BE49-F238E27FC236}">
+                <a16:creationId xmlns:a16="http://schemas.microsoft.com/office/drawing/2014/main" id="{30C5B154-81B1-4C25-B707-F4CD3F004F3E}"/>
+              </a:ext>
+            </a:extLst>
+          </p:cNvPr>
+          <p:cNvGrpSpPr/>
+          <p:nvPr/>
+        </p:nvGrpSpPr>
+        <p:grpSpPr>
+          <a:xfrm>
+            <a:off x="1330065" y="1076159"/>
+            <a:ext cx="10041357" cy="3859635"/>
+            <a:chOff x="1330065" y="1076159"/>
+            <a:chExt cx="10041357" cy="3859635"/>
+          </a:xfrm>
+        </p:grpSpPr>
+        <p:sp>
+          <p:nvSpPr>
+            <p:cNvPr id="8" name="Rectangle: Rounded Corners 7">
+              <a:extLst>
+                <a:ext uri="{FF2B5EF4-FFF2-40B4-BE49-F238E27FC236}">
+                  <a16:creationId xmlns:a16="http://schemas.microsoft.com/office/drawing/2014/main" id="{D0A64E6B-BEDF-4108-83D7-7A509AC81F0C}"/>
+                </a:ext>
+              </a:extLst>
+            </p:cNvPr>
+            <p:cNvSpPr/>
+            <p:nvPr/>
+          </p:nvSpPr>
+          <p:spPr>
+            <a:xfrm>
+              <a:off x="1777181" y="1582999"/>
+              <a:ext cx="2386557" cy="3352795"/>
+            </a:xfrm>
+            <a:prstGeom prst="roundRect">
+              <a:avLst>
+                <a:gd name="adj" fmla="val 13263"/>
+              </a:avLst>
+            </a:prstGeom>
+            <a:noFill/>
+            <a:ln w="19050">
+              <a:solidFill>
+                <a:schemeClr val="tx1"/>
+              </a:solidFill>
+            </a:ln>
+          </p:spPr>
+          <p:style>
+            <a:lnRef idx="2">
+              <a:schemeClr val="accent1">
+                <a:shade val="50000"/>
+              </a:schemeClr>
+            </a:lnRef>
+            <a:fillRef idx="1">
+              <a:schemeClr val="accent1"/>
+            </a:fillRef>
+            <a:effectRef idx="0">
+              <a:schemeClr val="accent1"/>
+            </a:effectRef>
+            <a:fontRef idx="minor">
+              <a:schemeClr val="lt1"/>
+            </a:fontRef>
+          </p:style>
+          <p:txBody>
+            <a:bodyPr rtlCol="0" anchor="ctr"/>
+            <a:lstStyle/>
+            <a:p>
+              <a:pPr algn="ctr"/>
+              <a:endParaRPr lang="zh-CN" altLang="en-US"/>
+            </a:p>
+          </p:txBody>
+        </p:sp>
+        <p:grpSp>
+          <p:nvGrpSpPr>
+            <p:cNvPr id="91" name="Group 90">
+              <a:extLst>
+                <a:ext uri="{FF2B5EF4-FFF2-40B4-BE49-F238E27FC236}">
+                  <a16:creationId xmlns:a16="http://schemas.microsoft.com/office/drawing/2014/main" id="{0C2ECA32-A7D9-4249-98C8-B5C7E1809DEE}"/>
+                </a:ext>
+              </a:extLst>
+            </p:cNvPr>
+            <p:cNvGrpSpPr/>
+            <p:nvPr/>
+          </p:nvGrpSpPr>
+          <p:grpSpPr>
+            <a:xfrm>
+              <a:off x="1925960" y="1826476"/>
+              <a:ext cx="2089000" cy="879988"/>
+              <a:chOff x="1925960" y="1826476"/>
+              <a:chExt cx="2089000" cy="879988"/>
+            </a:xfrm>
+          </p:grpSpPr>
+          <p:sp>
+            <p:nvSpPr>
+              <p:cNvPr id="35" name="Rectangle: Rounded Corners 34">
+                <a:extLst>
+                  <a:ext uri="{FF2B5EF4-FFF2-40B4-BE49-F238E27FC236}">
+                    <a16:creationId xmlns:a16="http://schemas.microsoft.com/office/drawing/2014/main" id="{1D0BAF33-56AC-45F7-8780-0CD503BC29EA}"/>
+                  </a:ext>
+                </a:extLst>
+              </p:cNvPr>
+              <p:cNvSpPr/>
+              <p:nvPr/>
+            </p:nvSpPr>
+            <p:spPr>
+              <a:xfrm>
+                <a:off x="1925960" y="1826476"/>
+                <a:ext cx="2089000" cy="879988"/>
+              </a:xfrm>
+              <a:prstGeom prst="roundRect">
+                <a:avLst>
+                  <a:gd name="adj" fmla="val 13263"/>
+                </a:avLst>
+              </a:prstGeom>
+              <a:solidFill>
+                <a:schemeClr val="accent5">
+                  <a:alpha val="60000"/>
+                </a:schemeClr>
+              </a:solidFill>
+              <a:ln w="19050">
+                <a:solidFill>
+                  <a:schemeClr val="tx1"/>
+                </a:solidFill>
+              </a:ln>
+            </p:spPr>
+            <p:style>
+              <a:lnRef idx="2">
+                <a:schemeClr val="accent1">
+                  <a:shade val="50000"/>
+                </a:schemeClr>
+              </a:lnRef>
+              <a:fillRef idx="1">
+                <a:schemeClr val="accent1"/>
+              </a:fillRef>
+              <a:effectRef idx="0">
+                <a:schemeClr val="accent1"/>
+              </a:effectRef>
+              <a:fontRef idx="minor">
+                <a:schemeClr val="lt1"/>
+              </a:fontRef>
+            </p:style>
+            <p:txBody>
+              <a:bodyPr rtlCol="0" anchor="ctr"/>
+              <a:lstStyle/>
+              <a:p>
+                <a:pPr algn="ctr"/>
+                <a:endParaRPr lang="zh-CN" altLang="en-US"/>
+              </a:p>
+            </p:txBody>
+          </p:sp>
+          <p:sp>
+            <p:nvSpPr>
+              <p:cNvPr id="37" name="Rectangle: Rounded Corners 36">
+                <a:extLst>
+                  <a:ext uri="{FF2B5EF4-FFF2-40B4-BE49-F238E27FC236}">
+                    <a16:creationId xmlns:a16="http://schemas.microsoft.com/office/drawing/2014/main" id="{6D3C831D-56F6-406D-939D-156E9D495FAA}"/>
+                  </a:ext>
+                </a:extLst>
+              </p:cNvPr>
+              <p:cNvSpPr/>
+              <p:nvPr/>
+            </p:nvSpPr>
+            <p:spPr>
+              <a:xfrm>
+                <a:off x="2086794" y="1914319"/>
+                <a:ext cx="1753602" cy="283316"/>
+              </a:xfrm>
+              <a:prstGeom prst="roundRect">
+                <a:avLst>
+                  <a:gd name="adj" fmla="val 13263"/>
+                </a:avLst>
+              </a:prstGeom>
+              <a:solidFill>
+                <a:schemeClr val="accent2">
+                  <a:alpha val="60000"/>
+                </a:schemeClr>
+              </a:solidFill>
+              <a:ln w="19050">
+                <a:solidFill>
+                  <a:schemeClr val="tx1"/>
+                </a:solidFill>
+              </a:ln>
+            </p:spPr>
+            <p:style>
+              <a:lnRef idx="2">
+                <a:schemeClr val="accent1">
+                  <a:shade val="50000"/>
+                </a:schemeClr>
+              </a:lnRef>
+              <a:fillRef idx="1">
+                <a:schemeClr val="accent1"/>
+              </a:fillRef>
+              <a:effectRef idx="0">
+                <a:schemeClr val="accent1"/>
+              </a:effectRef>
+              <a:fontRef idx="minor">
+                <a:schemeClr val="lt1"/>
+              </a:fontRef>
+            </p:style>
+            <p:txBody>
+              <a:bodyPr rtlCol="0" anchor="ctr"/>
+              <a:lstStyle/>
+              <a:p>
+                <a:pPr algn="ctr"/>
+                <a:r>
+                  <a:rPr lang="en-US" altLang="zh-CN">
+                    <a:solidFill>
+                      <a:schemeClr val="tx1"/>
+                    </a:solidFill>
+                  </a:rPr>
+                  <a:t>Det. Compo</a:t>
+                </a:r>
+                <a:endParaRPr lang="zh-CN" altLang="en-US">
+                  <a:solidFill>
+                    <a:schemeClr val="tx1"/>
+                  </a:solidFill>
+                </a:endParaRPr>
+              </a:p>
+            </p:txBody>
+          </p:sp>
+          <p:sp>
+            <p:nvSpPr>
+              <p:cNvPr id="38" name="Rectangle: Rounded Corners 37">
+                <a:extLst>
+                  <a:ext uri="{FF2B5EF4-FFF2-40B4-BE49-F238E27FC236}">
+                    <a16:creationId xmlns:a16="http://schemas.microsoft.com/office/drawing/2014/main" id="{3B63729A-0CD1-40F6-8AAE-4A56E65102D7}"/>
+                  </a:ext>
+                </a:extLst>
+              </p:cNvPr>
+              <p:cNvSpPr/>
+              <p:nvPr/>
+            </p:nvSpPr>
+            <p:spPr>
+              <a:xfrm>
+                <a:off x="2081606" y="2335305"/>
+                <a:ext cx="1753602" cy="283316"/>
+              </a:xfrm>
+              <a:prstGeom prst="roundRect">
+                <a:avLst>
+                  <a:gd name="adj" fmla="val 13263"/>
+                </a:avLst>
+              </a:prstGeom>
+              <a:solidFill>
+                <a:schemeClr val="accent6">
+                  <a:alpha val="60000"/>
+                </a:schemeClr>
+              </a:solidFill>
+              <a:ln w="19050">
+                <a:solidFill>
+                  <a:schemeClr val="tx1"/>
+                </a:solidFill>
+              </a:ln>
+            </p:spPr>
+            <p:style>
+              <a:lnRef idx="2">
+                <a:schemeClr val="accent1">
+                  <a:shade val="50000"/>
+                </a:schemeClr>
+              </a:lnRef>
+              <a:fillRef idx="1">
+                <a:schemeClr val="accent1"/>
+              </a:fillRef>
+              <a:effectRef idx="0">
+                <a:schemeClr val="accent1"/>
+              </a:effectRef>
+              <a:fontRef idx="minor">
+                <a:schemeClr val="lt1"/>
+              </a:fontRef>
+            </p:style>
+            <p:txBody>
+              <a:bodyPr rtlCol="0" anchor="ctr"/>
+              <a:lstStyle/>
+              <a:p>
+                <a:pPr algn="ctr"/>
+                <a:r>
+                  <a:rPr lang="en-US" altLang="zh-CN">
+                    <a:solidFill>
+                      <a:schemeClr val="tx1"/>
+                    </a:solidFill>
+                  </a:rPr>
+                  <a:t>Base + NF</a:t>
+                </a:r>
+                <a:endParaRPr lang="zh-CN" altLang="en-US">
+                  <a:solidFill>
+                    <a:schemeClr val="tx1"/>
+                  </a:solidFill>
+                </a:endParaRPr>
+              </a:p>
+            </p:txBody>
+          </p:sp>
+        </p:grpSp>
+        <p:sp>
+          <p:nvSpPr>
+            <p:cNvPr id="50" name="Rectangle: Rounded Corners 49">
+              <a:extLst>
+                <a:ext uri="{FF2B5EF4-FFF2-40B4-BE49-F238E27FC236}">
+                  <a16:creationId xmlns:a16="http://schemas.microsoft.com/office/drawing/2014/main" id="{BEDDF9C9-2697-46A6-990D-220090E2DB4A}"/>
+                </a:ext>
+              </a:extLst>
+            </p:cNvPr>
+            <p:cNvSpPr/>
+            <p:nvPr/>
+          </p:nvSpPr>
+          <p:spPr>
+            <a:xfrm>
+              <a:off x="1925960" y="3017349"/>
+              <a:ext cx="2089000" cy="484097"/>
+            </a:xfrm>
+            <a:prstGeom prst="roundRect">
+              <a:avLst>
+                <a:gd name="adj" fmla="val 13263"/>
+              </a:avLst>
+            </a:prstGeom>
+            <a:noFill/>
+            <a:ln w="19050">
+              <a:solidFill>
+                <a:schemeClr val="tx1"/>
+              </a:solidFill>
+            </a:ln>
+          </p:spPr>
+          <p:style>
+            <a:lnRef idx="2">
+              <a:schemeClr val="accent1">
+                <a:shade val="50000"/>
+              </a:schemeClr>
+            </a:lnRef>
+            <a:fillRef idx="1">
+              <a:schemeClr val="accent1"/>
+            </a:fillRef>
+            <a:effectRef idx="0">
+              <a:schemeClr val="accent1"/>
+            </a:effectRef>
+            <a:fontRef idx="minor">
+              <a:schemeClr val="lt1"/>
+            </a:fontRef>
+          </p:style>
+          <p:txBody>
+            <a:bodyPr rtlCol="0" anchor="ctr"/>
+            <a:lstStyle/>
+            <a:p>
+              <a:pPr algn="ctr"/>
+              <a:r>
+                <a:rPr lang="en-US" altLang="zh-CN">
+                  <a:solidFill>
+                    <a:schemeClr val="tx1"/>
+                  </a:solidFill>
+                </a:rPr>
+                <a:t>Det. Layers</a:t>
+              </a:r>
+              <a:endParaRPr lang="zh-CN" altLang="en-US">
+                <a:solidFill>
+                  <a:schemeClr val="tx1"/>
+                </a:solidFill>
+              </a:endParaRPr>
+            </a:p>
+          </p:txBody>
+        </p:sp>
+        <mc:AlternateContent xmlns:mc="http://schemas.openxmlformats.org/markup-compatibility/2006" xmlns:a14="http://schemas.microsoft.com/office/drawing/2010/main">
+          <mc:Choice Requires="a14">
+            <p:sp>
+              <p:nvSpPr>
+                <p:cNvPr id="15" name="TextBox 14">
+                  <a:extLst>
+                    <a:ext uri="{FF2B5EF4-FFF2-40B4-BE49-F238E27FC236}">
+                      <a16:creationId xmlns:a16="http://schemas.microsoft.com/office/drawing/2014/main" id="{E11CD8E6-50B4-4FB3-939B-C845917C692C}"/>
+                    </a:ext>
+                  </a:extLst>
+                </p:cNvPr>
+                <p:cNvSpPr txBox="1"/>
+                <p:nvPr/>
+              </p:nvSpPr>
+              <p:spPr>
+                <a:xfrm>
+                  <a:off x="2901945" y="2723407"/>
+                  <a:ext cx="137029" cy="276999"/>
+                </a:xfrm>
+                <a:prstGeom prst="rect">
+                  <a:avLst/>
+                </a:prstGeom>
+                <a:noFill/>
+              </p:spPr>
+              <p:txBody>
+                <a:bodyPr wrap="none" lIns="0" tIns="0" rIns="0" bIns="0" rtlCol="0">
+                  <a:spAutoFit/>
+                </a:bodyPr>
+                <a:lstStyle/>
+                <a:p>
+                  <a:pPr/>
+                  <a14:m>
+                    <m:oMathPara xmlns:m="http://schemas.openxmlformats.org/officeDocument/2006/math">
+                      <m:oMathParaPr>
+                        <m:jc m:val="centerGroup"/>
+                      </m:oMathParaPr>
+                      <m:oMath xmlns:m="http://schemas.openxmlformats.org/officeDocument/2006/math">
+                        <m:r>
+                          <a:rPr lang="zh-CN" altLang="en-US" i="1" smtClean="0">
+                            <a:latin typeface="Cambria Math" panose="02040503050406030204" pitchFamily="18" charset="0"/>
+                          </a:rPr>
+                          <m:t>⋮</m:t>
+                        </m:r>
+                      </m:oMath>
+                    </m:oMathPara>
+                  </a14:m>
+                  <a:endParaRPr lang="zh-CN" altLang="en-US"/>
+                </a:p>
+              </p:txBody>
+            </p:sp>
+          </mc:Choice>
+          <mc:Fallback xmlns="">
+            <p:sp>
+              <p:nvSpPr>
+                <p:cNvPr id="15" name="TextBox 14">
+                  <a:extLst>
+                    <a:ext uri="{FF2B5EF4-FFF2-40B4-BE49-F238E27FC236}">
+                      <a16:creationId xmlns:a16="http://schemas.microsoft.com/office/drawing/2014/main" id="{E11CD8E6-50B4-4FB3-939B-C845917C692C}"/>
+                    </a:ext>
+                  </a:extLst>
+                </p:cNvPr>
+                <p:cNvSpPr txBox="1">
+                  <a:spLocks noRot="1" noChangeAspect="1" noMove="1" noResize="1" noEditPoints="1" noAdjustHandles="1" noChangeArrowheads="1" noChangeShapeType="1" noTextEdit="1"/>
+                </p:cNvSpPr>
+                <p:nvPr/>
+              </p:nvSpPr>
+              <p:spPr>
+                <a:xfrm>
+                  <a:off x="2901945" y="2723407"/>
+                  <a:ext cx="137029" cy="276999"/>
+                </a:xfrm>
+                <a:prstGeom prst="rect">
+                  <a:avLst/>
+                </a:prstGeom>
+                <a:blipFill>
+                  <a:blip r:embed="rId3"/>
+                  <a:stretch>
+                    <a:fillRect l="-34783" r="-30435" b="-8889"/>
+                  </a:stretch>
+                </a:blipFill>
+              </p:spPr>
+              <p:txBody>
+                <a:bodyPr/>
+                <a:lstStyle/>
+                <a:p>
+                  <a:r>
+                    <a:rPr lang="zh-CN" altLang="en-US">
+                      <a:noFill/>
+                    </a:rPr>
+                    <a:t> </a:t>
+                  </a:r>
+                </a:p>
+              </p:txBody>
+            </p:sp>
+          </mc:Fallback>
+        </mc:AlternateContent>
+        <mc:AlternateContent xmlns:mc="http://schemas.openxmlformats.org/markup-compatibility/2006" xmlns:a14="http://schemas.microsoft.com/office/drawing/2010/main">
+          <mc:Choice Requires="a14">
+            <p:sp>
+              <p:nvSpPr>
+                <p:cNvPr id="54" name="TextBox 53">
+                  <a:extLst>
+                    <a:ext uri="{FF2B5EF4-FFF2-40B4-BE49-F238E27FC236}">
+                      <a16:creationId xmlns:a16="http://schemas.microsoft.com/office/drawing/2014/main" id="{E59046DF-CB3F-4782-9F47-49A4CBDA546D}"/>
+                    </a:ext>
+                  </a:extLst>
+                </p:cNvPr>
+                <p:cNvSpPr txBox="1"/>
+                <p:nvPr/>
+              </p:nvSpPr>
+              <p:spPr>
+                <a:xfrm>
+                  <a:off x="2901945" y="3518388"/>
+                  <a:ext cx="137029" cy="276999"/>
+                </a:xfrm>
+                <a:prstGeom prst="rect">
+                  <a:avLst/>
+                </a:prstGeom>
+                <a:noFill/>
+              </p:spPr>
+              <p:txBody>
+                <a:bodyPr wrap="none" lIns="0" tIns="0" rIns="0" bIns="0" rtlCol="0">
+                  <a:spAutoFit/>
+                </a:bodyPr>
+                <a:lstStyle/>
+                <a:p>
+                  <a:pPr/>
+                  <a14:m>
+                    <m:oMathPara xmlns:m="http://schemas.openxmlformats.org/officeDocument/2006/math">
+                      <m:oMathParaPr>
+                        <m:jc m:val="centerGroup"/>
+                      </m:oMathParaPr>
+                      <m:oMath xmlns:m="http://schemas.openxmlformats.org/officeDocument/2006/math">
+                        <m:r>
+                          <a:rPr lang="zh-CN" altLang="en-US" i="1" smtClean="0">
+                            <a:latin typeface="Cambria Math" panose="02040503050406030204" pitchFamily="18" charset="0"/>
+                          </a:rPr>
+                          <m:t>⋮</m:t>
+                        </m:r>
+                      </m:oMath>
+                    </m:oMathPara>
+                  </a14:m>
+                  <a:endParaRPr lang="zh-CN" altLang="en-US"/>
+                </a:p>
+              </p:txBody>
+            </p:sp>
+          </mc:Choice>
+          <mc:Fallback xmlns="">
+            <p:sp>
+              <p:nvSpPr>
+                <p:cNvPr id="54" name="TextBox 53">
+                  <a:extLst>
+                    <a:ext uri="{FF2B5EF4-FFF2-40B4-BE49-F238E27FC236}">
+                      <a16:creationId xmlns:a16="http://schemas.microsoft.com/office/drawing/2014/main" id="{E59046DF-CB3F-4782-9F47-49A4CBDA546D}"/>
+                    </a:ext>
+                  </a:extLst>
+                </p:cNvPr>
+                <p:cNvSpPr txBox="1">
+                  <a:spLocks noRot="1" noChangeAspect="1" noMove="1" noResize="1" noEditPoints="1" noAdjustHandles="1" noChangeArrowheads="1" noChangeShapeType="1" noTextEdit="1"/>
+                </p:cNvSpPr>
+                <p:nvPr/>
+              </p:nvSpPr>
+              <p:spPr>
+                <a:xfrm>
+                  <a:off x="2901945" y="3518388"/>
+                  <a:ext cx="137029" cy="276999"/>
+                </a:xfrm>
+                <a:prstGeom prst="rect">
+                  <a:avLst/>
+                </a:prstGeom>
+                <a:blipFill>
+                  <a:blip r:embed="rId4"/>
+                  <a:stretch>
+                    <a:fillRect l="-34783" r="-30435" b="-6522"/>
+                  </a:stretch>
+                </a:blipFill>
+              </p:spPr>
+              <p:txBody>
+                <a:bodyPr/>
+                <a:lstStyle/>
+                <a:p>
+                  <a:r>
+                    <a:rPr lang="zh-CN" altLang="en-US">
+                      <a:noFill/>
+                    </a:rPr>
+                    <a:t> </a:t>
+                  </a:r>
+                </a:p>
+              </p:txBody>
+            </p:sp>
+          </mc:Fallback>
+        </mc:AlternateContent>
+        <p:sp>
+          <p:nvSpPr>
+            <p:cNvPr id="87" name="TextBox 86">
+              <a:extLst>
+                <a:ext uri="{FF2B5EF4-FFF2-40B4-BE49-F238E27FC236}">
+                  <a16:creationId xmlns:a16="http://schemas.microsoft.com/office/drawing/2014/main" id="{6AC05952-8A83-46A0-A313-DF5A27676584}"/>
+                </a:ext>
+              </a:extLst>
+            </p:cNvPr>
+            <p:cNvSpPr txBox="1"/>
+            <p:nvPr/>
+          </p:nvSpPr>
+          <p:spPr>
+            <a:xfrm>
+              <a:off x="1330065" y="1076159"/>
+              <a:ext cx="3132811" cy="400110"/>
+            </a:xfrm>
+            <a:prstGeom prst="rect">
+              <a:avLst/>
+            </a:prstGeom>
+            <a:noFill/>
+          </p:spPr>
+          <p:txBody>
+            <a:bodyPr wrap="square">
+              <a:spAutoFit/>
+            </a:bodyPr>
+            <a:lstStyle/>
+            <a:p>
+              <a:pPr algn="ctr"/>
+              <a:r>
+                <a:rPr lang="en-US" altLang="zh-CN" sz="2000"/>
+                <a:t>General Structure</a:t>
+              </a:r>
+              <a:endParaRPr lang="zh-CN" altLang="en-US" sz="2000"/>
+            </a:p>
+          </p:txBody>
+        </p:sp>
+        <p:grpSp>
+          <p:nvGrpSpPr>
+            <p:cNvPr id="7" name="Group 6">
+              <a:extLst>
+                <a:ext uri="{FF2B5EF4-FFF2-40B4-BE49-F238E27FC236}">
+                  <a16:creationId xmlns:a16="http://schemas.microsoft.com/office/drawing/2014/main" id="{9B1A6839-C418-472E-9AEF-597756682752}"/>
+                </a:ext>
+              </a:extLst>
+            </p:cNvPr>
+            <p:cNvGrpSpPr/>
+            <p:nvPr/>
+          </p:nvGrpSpPr>
+          <p:grpSpPr>
+            <a:xfrm>
+              <a:off x="4468864" y="1582999"/>
+              <a:ext cx="6884936" cy="1941087"/>
+              <a:chOff x="4487616" y="1704203"/>
+              <a:chExt cx="6884936" cy="1941087"/>
+            </a:xfrm>
+          </p:grpSpPr>
+          <p:sp>
+            <p:nvSpPr>
+              <p:cNvPr id="89" name="Rectangle: Rounded Corners 88">
+                <a:extLst>
+                  <a:ext uri="{FF2B5EF4-FFF2-40B4-BE49-F238E27FC236}">
+                    <a16:creationId xmlns:a16="http://schemas.microsoft.com/office/drawing/2014/main" id="{A0CC422C-6697-4134-9231-0691601F4048}"/>
+                  </a:ext>
+                </a:extLst>
+              </p:cNvPr>
+              <p:cNvSpPr/>
+              <p:nvPr/>
+            </p:nvSpPr>
+            <p:spPr>
+              <a:xfrm>
+                <a:off x="4487616" y="1704203"/>
+                <a:ext cx="6884936" cy="1941087"/>
+              </a:xfrm>
+              <a:prstGeom prst="roundRect">
+                <a:avLst>
+                  <a:gd name="adj" fmla="val 13263"/>
+                </a:avLst>
+              </a:prstGeom>
+              <a:solidFill>
+                <a:schemeClr val="accent5">
+                  <a:alpha val="60000"/>
+                </a:schemeClr>
+              </a:solidFill>
+              <a:ln w="19050">
+                <a:solidFill>
+                  <a:schemeClr val="tx1"/>
+                </a:solidFill>
+              </a:ln>
+            </p:spPr>
+            <p:style>
+              <a:lnRef idx="2">
+                <a:schemeClr val="accent1">
+                  <a:shade val="50000"/>
+                </a:schemeClr>
+              </a:lnRef>
+              <a:fillRef idx="1">
+                <a:schemeClr val="accent1"/>
+              </a:fillRef>
+              <a:effectRef idx="0">
+                <a:schemeClr val="accent1"/>
+              </a:effectRef>
+              <a:fontRef idx="minor">
+                <a:schemeClr val="lt1"/>
+              </a:fontRef>
+            </p:style>
+            <p:txBody>
+              <a:bodyPr rtlCol="0" anchor="ctr"/>
+              <a:lstStyle/>
+              <a:p>
+                <a:pPr algn="ctr"/>
+                <a:endParaRPr lang="zh-CN" altLang="en-US"/>
+              </a:p>
+            </p:txBody>
+          </p:sp>
+          <p:sp>
+            <p:nvSpPr>
+              <p:cNvPr id="72" name="Rectangle 71">
+                <a:extLst>
+                  <a:ext uri="{FF2B5EF4-FFF2-40B4-BE49-F238E27FC236}">
+                    <a16:creationId xmlns:a16="http://schemas.microsoft.com/office/drawing/2014/main" id="{527BFD08-29AB-48A7-95B2-60316778CA04}"/>
+                  </a:ext>
+                </a:extLst>
+              </p:cNvPr>
+              <p:cNvSpPr/>
+              <p:nvPr/>
+            </p:nvSpPr>
+            <p:spPr>
+              <a:xfrm>
+                <a:off x="4744147" y="2103463"/>
+                <a:ext cx="1147665" cy="461666"/>
+              </a:xfrm>
+              <a:prstGeom prst="rect">
+                <a:avLst/>
+              </a:prstGeom>
+              <a:solidFill>
+                <a:schemeClr val="accent3">
+                  <a:alpha val="60000"/>
+                </a:schemeClr>
+              </a:solidFill>
+              <a:ln w="19050"/>
+            </p:spPr>
+            <p:style>
+              <a:lnRef idx="2">
+                <a:schemeClr val="dk1"/>
+              </a:lnRef>
+              <a:fillRef idx="1">
+                <a:schemeClr val="lt1"/>
+              </a:fillRef>
+              <a:effectRef idx="0">
+                <a:schemeClr val="dk1"/>
+              </a:effectRef>
+              <a:fontRef idx="minor">
+                <a:schemeClr val="dk1"/>
+              </a:fontRef>
+            </p:style>
+            <p:txBody>
+              <a:bodyPr rtlCol="0" anchor="ctr"/>
+              <a:lstStyle/>
+              <a:p>
+                <a:pPr algn="ctr"/>
+                <a:r>
+                  <a:rPr lang="en-US" altLang="zh-CN"/>
+                  <a:t>Input</a:t>
+                </a:r>
+                <a:endParaRPr lang="zh-CN" altLang="en-US"/>
+              </a:p>
+            </p:txBody>
+          </p:sp>
+          <p:sp>
+            <p:nvSpPr>
+              <p:cNvPr id="73" name="Rectangle 72">
+                <a:extLst>
+                  <a:ext uri="{FF2B5EF4-FFF2-40B4-BE49-F238E27FC236}">
+                    <a16:creationId xmlns:a16="http://schemas.microsoft.com/office/drawing/2014/main" id="{6A7CA65D-8580-4F41-8C68-BCD118EF5547}"/>
+                  </a:ext>
+                </a:extLst>
+              </p:cNvPr>
+              <p:cNvSpPr/>
+              <p:nvPr/>
+            </p:nvSpPr>
+            <p:spPr>
+              <a:xfrm>
+                <a:off x="4744147" y="3010332"/>
+                <a:ext cx="1147665" cy="461666"/>
+              </a:xfrm>
+              <a:prstGeom prst="rect">
+                <a:avLst/>
+              </a:prstGeom>
+              <a:solidFill>
+                <a:schemeClr val="accent6">
+                  <a:alpha val="60000"/>
+                </a:schemeClr>
+              </a:solidFill>
+              <a:ln w="19050"/>
+            </p:spPr>
+            <p:style>
+              <a:lnRef idx="2">
+                <a:schemeClr val="dk1"/>
+              </a:lnRef>
+              <a:fillRef idx="1">
+                <a:schemeClr val="lt1"/>
+              </a:fillRef>
+              <a:effectRef idx="0">
+                <a:schemeClr val="dk1"/>
+              </a:effectRef>
+              <a:fontRef idx="minor">
+                <a:schemeClr val="dk1"/>
+              </a:fontRef>
+            </p:style>
+            <p:txBody>
+              <a:bodyPr rtlCol="0" anchor="ctr"/>
+              <a:lstStyle/>
+              <a:p>
+                <a:pPr algn="ctr"/>
+                <a:r>
+                  <a:rPr lang="en-US" altLang="zh-CN" dirty="0"/>
+                  <a:t>Base Dist.</a:t>
+                </a:r>
+                <a:endParaRPr lang="zh-CN" altLang="en-US"/>
+              </a:p>
+            </p:txBody>
+          </p:sp>
+          <p:sp>
+            <p:nvSpPr>
+              <p:cNvPr id="74" name="Rectangle 73">
+                <a:extLst>
+                  <a:ext uri="{FF2B5EF4-FFF2-40B4-BE49-F238E27FC236}">
+                    <a16:creationId xmlns:a16="http://schemas.microsoft.com/office/drawing/2014/main" id="{58B3FAB7-2E51-4A15-A1A6-E64339704ED7}"/>
+                  </a:ext>
+                </a:extLst>
+              </p:cNvPr>
+              <p:cNvSpPr/>
+              <p:nvPr/>
+            </p:nvSpPr>
+            <p:spPr>
+              <a:xfrm>
+                <a:off x="7050252" y="3014505"/>
+                <a:ext cx="1147665" cy="461666"/>
+              </a:xfrm>
+              <a:prstGeom prst="rect">
+                <a:avLst/>
+              </a:prstGeom>
+              <a:solidFill>
+                <a:schemeClr val="accent6">
+                  <a:alpha val="60000"/>
+                </a:schemeClr>
+              </a:solidFill>
+              <a:ln w="19050"/>
+            </p:spPr>
+            <p:style>
+              <a:lnRef idx="2">
+                <a:schemeClr val="dk1"/>
+              </a:lnRef>
+              <a:fillRef idx="1">
+                <a:schemeClr val="lt1"/>
+              </a:fillRef>
+              <a:effectRef idx="0">
+                <a:schemeClr val="dk1"/>
+              </a:effectRef>
+              <a:fontRef idx="minor">
+                <a:schemeClr val="dk1"/>
+              </a:fontRef>
+            </p:style>
+            <p:txBody>
+              <a:bodyPr rtlCol="0" anchor="ctr"/>
+              <a:lstStyle/>
+              <a:p>
+                <a:pPr algn="ctr"/>
+                <a:r>
+                  <a:rPr lang="en-US" altLang="zh-CN" dirty="0"/>
+                  <a:t>NF</a:t>
+                </a:r>
+                <a:endParaRPr lang="zh-CN" altLang="en-US"/>
+              </a:p>
+            </p:txBody>
+          </p:sp>
+          <p:sp>
+            <p:nvSpPr>
+              <p:cNvPr id="75" name="Rectangle 74">
+                <a:extLst>
+                  <a:ext uri="{FF2B5EF4-FFF2-40B4-BE49-F238E27FC236}">
+                    <a16:creationId xmlns:a16="http://schemas.microsoft.com/office/drawing/2014/main" id="{092747D9-4AF5-4D53-A5D6-6A020F7C0E28}"/>
+                  </a:ext>
+                </a:extLst>
+              </p:cNvPr>
+              <p:cNvSpPr/>
+              <p:nvPr/>
+            </p:nvSpPr>
+            <p:spPr>
+              <a:xfrm>
+                <a:off x="9569340" y="2103463"/>
+                <a:ext cx="1497100" cy="461666"/>
+              </a:xfrm>
+              <a:prstGeom prst="rect">
+                <a:avLst/>
+              </a:prstGeom>
+              <a:solidFill>
+                <a:schemeClr val="accent2">
+                  <a:alpha val="60000"/>
+                </a:schemeClr>
+              </a:solidFill>
+              <a:ln w="19050"/>
+            </p:spPr>
+            <p:style>
+              <a:lnRef idx="2">
+                <a:schemeClr val="dk1"/>
+              </a:lnRef>
+              <a:fillRef idx="1">
+                <a:schemeClr val="lt1"/>
+              </a:fillRef>
+              <a:effectRef idx="0">
+                <a:schemeClr val="dk1"/>
+              </a:effectRef>
+              <a:fontRef idx="minor">
+                <a:schemeClr val="dk1"/>
+              </a:fontRef>
+            </p:style>
+            <p:txBody>
+              <a:bodyPr rtlCol="0" anchor="ctr"/>
+              <a:lstStyle/>
+              <a:p>
+                <a:pPr algn="ctr"/>
+                <a:r>
+                  <a:rPr lang="en-US" altLang="zh-CN"/>
+                  <a:t>Det. Compo</a:t>
+                </a:r>
+                <a:endParaRPr lang="zh-CN" altLang="en-US"/>
+              </a:p>
+            </p:txBody>
+          </p:sp>
+          <p:cxnSp>
+            <p:nvCxnSpPr>
+              <p:cNvPr id="76" name="Straight Arrow Connector 75">
+                <a:extLst>
+                  <a:ext uri="{FF2B5EF4-FFF2-40B4-BE49-F238E27FC236}">
+                    <a16:creationId xmlns:a16="http://schemas.microsoft.com/office/drawing/2014/main" id="{60F3CF84-C924-491E-8055-D43C5939AEFE}"/>
+                  </a:ext>
+                </a:extLst>
+              </p:cNvPr>
+              <p:cNvCxnSpPr>
+                <a:stCxn id="73" idx="3"/>
+                <a:endCxn id="74" idx="1"/>
+              </p:cNvCxnSpPr>
+              <p:nvPr/>
+            </p:nvCxnSpPr>
+            <p:spPr>
+              <a:xfrm>
+                <a:off x="5891812" y="3241165"/>
+                <a:ext cx="1158440" cy="4173"/>
+              </a:xfrm>
+              <a:prstGeom prst="straightConnector1">
+                <a:avLst/>
+              </a:prstGeom>
+              <a:ln w="19050">
+                <a:solidFill>
+                  <a:schemeClr val="tx1"/>
+                </a:solidFill>
+                <a:tailEnd type="triangle"/>
+              </a:ln>
+            </p:spPr>
+            <p:style>
+              <a:lnRef idx="1">
+                <a:schemeClr val="accent1"/>
+              </a:lnRef>
+              <a:fillRef idx="0">
+                <a:schemeClr val="accent1"/>
+              </a:fillRef>
+              <a:effectRef idx="0">
+                <a:schemeClr val="accent1"/>
+              </a:effectRef>
+              <a:fontRef idx="minor">
+                <a:schemeClr val="tx1"/>
+              </a:fontRef>
+            </p:style>
+          </p:cxnSp>
+          <p:cxnSp>
+            <p:nvCxnSpPr>
+              <p:cNvPr id="77" name="Connector: Elbow 76">
+                <a:extLst>
+                  <a:ext uri="{FF2B5EF4-FFF2-40B4-BE49-F238E27FC236}">
+                    <a16:creationId xmlns:a16="http://schemas.microsoft.com/office/drawing/2014/main" id="{97FFC071-583A-4517-91DF-C141D5606BD0}"/>
+                  </a:ext>
+                </a:extLst>
+              </p:cNvPr>
+              <p:cNvCxnSpPr>
+                <a:cxnSpLocks/>
+                <a:stCxn id="74" idx="3"/>
+                <a:endCxn id="82" idx="4"/>
+              </p:cNvCxnSpPr>
+              <p:nvPr/>
+            </p:nvCxnSpPr>
+            <p:spPr>
+              <a:xfrm flipV="1">
+                <a:off x="8197917" y="2504964"/>
+                <a:ext cx="460425" cy="740374"/>
+              </a:xfrm>
+              <a:prstGeom prst="bentConnector2">
+                <a:avLst/>
+              </a:prstGeom>
+              <a:ln w="19050">
+                <a:solidFill>
+                  <a:schemeClr val="tx1"/>
+                </a:solidFill>
+                <a:tailEnd type="triangle"/>
+              </a:ln>
+            </p:spPr>
+            <p:style>
+              <a:lnRef idx="1">
+                <a:schemeClr val="accent1"/>
+              </a:lnRef>
+              <a:fillRef idx="0">
+                <a:schemeClr val="accent1"/>
+              </a:fillRef>
+              <a:effectRef idx="0">
+                <a:schemeClr val="accent1"/>
+              </a:effectRef>
+              <a:fontRef idx="minor">
+                <a:schemeClr val="tx1"/>
+              </a:fontRef>
+            </p:style>
+          </p:cxnSp>
+          <p:cxnSp>
+            <p:nvCxnSpPr>
+              <p:cNvPr id="78" name="Straight Arrow Connector 77">
+                <a:extLst>
+                  <a:ext uri="{FF2B5EF4-FFF2-40B4-BE49-F238E27FC236}">
+                    <a16:creationId xmlns:a16="http://schemas.microsoft.com/office/drawing/2014/main" id="{BA13E3A1-0121-45D2-9BBE-FA977B4718C7}"/>
+                  </a:ext>
+                </a:extLst>
+              </p:cNvPr>
+              <p:cNvCxnSpPr>
+                <a:cxnSpLocks/>
+                <a:stCxn id="72" idx="3"/>
+                <a:endCxn id="82" idx="2"/>
+              </p:cNvCxnSpPr>
+              <p:nvPr/>
+            </p:nvCxnSpPr>
+            <p:spPr>
+              <a:xfrm flipV="1">
+                <a:off x="5891812" y="2324964"/>
+                <a:ext cx="2586530" cy="9332"/>
+              </a:xfrm>
+              <a:prstGeom prst="straightConnector1">
+                <a:avLst/>
+              </a:prstGeom>
+              <a:ln w="19050">
+                <a:solidFill>
+                  <a:schemeClr val="tx1"/>
+                </a:solidFill>
+                <a:tailEnd type="triangle"/>
+              </a:ln>
+            </p:spPr>
+            <p:style>
+              <a:lnRef idx="1">
+                <a:schemeClr val="accent1"/>
+              </a:lnRef>
+              <a:fillRef idx="0">
+                <a:schemeClr val="accent1"/>
+              </a:fillRef>
+              <a:effectRef idx="0">
+                <a:schemeClr val="accent1"/>
+              </a:effectRef>
+              <a:fontRef idx="minor">
+                <a:schemeClr val="tx1"/>
+              </a:fontRef>
+            </p:style>
+          </p:cxnSp>
+          <p:cxnSp>
+            <p:nvCxnSpPr>
+              <p:cNvPr id="79" name="Straight Arrow Connector 78">
+                <a:extLst>
+                  <a:ext uri="{FF2B5EF4-FFF2-40B4-BE49-F238E27FC236}">
+                    <a16:creationId xmlns:a16="http://schemas.microsoft.com/office/drawing/2014/main" id="{1575DC75-75F0-4B92-AFD3-41F6E9752E49}"/>
+                  </a:ext>
+                </a:extLst>
+              </p:cNvPr>
+              <p:cNvCxnSpPr>
+                <a:cxnSpLocks/>
+              </p:cNvCxnSpPr>
+              <p:nvPr/>
+            </p:nvCxnSpPr>
+            <p:spPr>
+              <a:xfrm flipV="1">
+                <a:off x="8816763" y="2334296"/>
+                <a:ext cx="753459" cy="2"/>
+              </a:xfrm>
+              <a:prstGeom prst="straightConnector1">
+                <a:avLst/>
+              </a:prstGeom>
+              <a:ln w="19050">
+                <a:solidFill>
+                  <a:schemeClr val="tx1"/>
+                </a:solidFill>
+                <a:tailEnd type="triangle"/>
+              </a:ln>
+            </p:spPr>
+            <p:style>
+              <a:lnRef idx="1">
+                <a:schemeClr val="accent1"/>
+              </a:lnRef>
+              <a:fillRef idx="0">
+                <a:schemeClr val="accent1"/>
+              </a:fillRef>
+              <a:effectRef idx="0">
+                <a:schemeClr val="accent1"/>
+              </a:effectRef>
+              <a:fontRef idx="minor">
+                <a:schemeClr val="tx1"/>
+              </a:fontRef>
+            </p:style>
+          </p:cxnSp>
+          <p:sp>
+            <p:nvSpPr>
+              <p:cNvPr id="81" name="TextBox 80">
+                <a:extLst>
+                  <a:ext uri="{FF2B5EF4-FFF2-40B4-BE49-F238E27FC236}">
+                    <a16:creationId xmlns:a16="http://schemas.microsoft.com/office/drawing/2014/main" id="{D9FAA3A1-45EC-483B-AFF3-64D8F8748C43}"/>
+                  </a:ext>
+                </a:extLst>
+              </p:cNvPr>
+              <p:cNvSpPr txBox="1"/>
+              <p:nvPr/>
+            </p:nvSpPr>
+            <p:spPr>
+              <a:xfrm>
+                <a:off x="4744147" y="2581146"/>
+                <a:ext cx="1182129" cy="369329"/>
+              </a:xfrm>
+              <a:prstGeom prst="rect">
+                <a:avLst/>
+              </a:prstGeom>
+              <a:noFill/>
+            </p:spPr>
+            <p:txBody>
+              <a:bodyPr wrap="square">
+                <a:spAutoFit/>
+              </a:bodyPr>
+              <a:lstStyle/>
+              <a:p>
+                <a:r>
+                  <a:rPr lang="en-US" altLang="zh-CN"/>
+                  <a:t>Stochastic</a:t>
+                </a:r>
+                <a:endParaRPr lang="zh-CN" altLang="en-US"/>
+              </a:p>
+            </p:txBody>
+          </p:sp>
+          <p:sp>
+            <p:nvSpPr>
+              <p:cNvPr id="82" name="Flowchart: Summing Junction 81">
+                <a:extLst>
+                  <a:ext uri="{FF2B5EF4-FFF2-40B4-BE49-F238E27FC236}">
+                    <a16:creationId xmlns:a16="http://schemas.microsoft.com/office/drawing/2014/main" id="{672E1E02-F98B-4F6C-9767-8680A19C9329}"/>
+                  </a:ext>
+                </a:extLst>
+              </p:cNvPr>
+              <p:cNvSpPr/>
+              <p:nvPr/>
+            </p:nvSpPr>
+            <p:spPr>
+              <a:xfrm>
+                <a:off x="8478342" y="2144964"/>
+                <a:ext cx="360000" cy="360000"/>
+              </a:xfrm>
+              <a:prstGeom prst="flowChartSummingJunction">
+                <a:avLst/>
+              </a:prstGeom>
+              <a:solidFill>
+                <a:schemeClr val="accent3">
+                  <a:alpha val="60000"/>
+                </a:schemeClr>
+              </a:solidFill>
+              <a:ln w="19050">
+                <a:solidFill>
+                  <a:schemeClr val="tx1"/>
+                </a:solidFill>
+              </a:ln>
+            </p:spPr>
+            <p:style>
+              <a:lnRef idx="2">
+                <a:schemeClr val="accent1">
+                  <a:shade val="50000"/>
+                </a:schemeClr>
+              </a:lnRef>
+              <a:fillRef idx="1">
+                <a:schemeClr val="accent1"/>
+              </a:fillRef>
+              <a:effectRef idx="0">
+                <a:schemeClr val="accent1"/>
+              </a:effectRef>
+              <a:fontRef idx="minor">
+                <a:schemeClr val="lt1"/>
+              </a:fontRef>
+            </p:style>
+            <p:txBody>
+              <a:bodyPr rtlCol="0" anchor="ctr"/>
+              <a:lstStyle/>
+              <a:p>
+                <a:pPr algn="ctr"/>
+                <a:endParaRPr lang="zh-CN" altLang="en-US"/>
+              </a:p>
+            </p:txBody>
+          </p:sp>
+          <p:sp>
+            <p:nvSpPr>
+              <p:cNvPr id="83" name="TextBox 82">
+                <a:extLst>
+                  <a:ext uri="{FF2B5EF4-FFF2-40B4-BE49-F238E27FC236}">
+                    <a16:creationId xmlns:a16="http://schemas.microsoft.com/office/drawing/2014/main" id="{83D33DAD-9F07-40B0-AB7A-38593FCB3882}"/>
+                  </a:ext>
+                </a:extLst>
+              </p:cNvPr>
+              <p:cNvSpPr txBox="1"/>
+              <p:nvPr/>
+            </p:nvSpPr>
+            <p:spPr>
+              <a:xfrm>
+                <a:off x="5811364" y="2801151"/>
+                <a:ext cx="1319336" cy="369332"/>
+              </a:xfrm>
+              <a:prstGeom prst="rect">
+                <a:avLst/>
+              </a:prstGeom>
+              <a:noFill/>
+            </p:spPr>
+            <p:txBody>
+              <a:bodyPr wrap="square">
+                <a:spAutoFit/>
+              </a:bodyPr>
+              <a:lstStyle/>
+              <a:p>
+                <a:pPr algn="ctr"/>
+                <a:r>
+                  <a:rPr lang="en-US" altLang="zh-CN" dirty="0"/>
+                  <a:t>samples</a:t>
+                </a:r>
+                <a:endParaRPr lang="zh-CN" altLang="en-US"/>
+              </a:p>
+            </p:txBody>
+          </p:sp>
+          <p:sp>
+            <p:nvSpPr>
+              <p:cNvPr id="84" name="TextBox 83">
+                <a:extLst>
+                  <a:ext uri="{FF2B5EF4-FFF2-40B4-BE49-F238E27FC236}">
+                    <a16:creationId xmlns:a16="http://schemas.microsoft.com/office/drawing/2014/main" id="{2985C03D-70EF-4BE7-85CA-C995EA92D972}"/>
+                  </a:ext>
+                </a:extLst>
+              </p:cNvPr>
+              <p:cNvSpPr txBox="1"/>
+              <p:nvPr/>
+            </p:nvSpPr>
+            <p:spPr>
+              <a:xfrm>
+                <a:off x="8688570" y="2593111"/>
+                <a:ext cx="2377870" cy="646331"/>
+              </a:xfrm>
+              <a:prstGeom prst="rect">
+                <a:avLst/>
+              </a:prstGeom>
+              <a:noFill/>
+            </p:spPr>
+            <p:txBody>
+              <a:bodyPr wrap="square">
+                <a:spAutoFit/>
+              </a:bodyPr>
+              <a:lstStyle/>
+              <a:p>
+                <a:r>
+                  <a:rPr lang="en-US" altLang="zh-CN" dirty="0"/>
+                  <a:t>transformed </a:t>
+                </a:r>
+              </a:p>
+              <a:p>
+                <a:r>
+                  <a:rPr lang="en-US" altLang="zh-CN" dirty="0"/>
+                  <a:t>samples</a:t>
+                </a:r>
+              </a:p>
+            </p:txBody>
+          </p:sp>
+          <p:sp>
+            <p:nvSpPr>
+              <p:cNvPr id="88" name="TextBox 87">
+                <a:extLst>
+                  <a:ext uri="{FF2B5EF4-FFF2-40B4-BE49-F238E27FC236}">
+                    <a16:creationId xmlns:a16="http://schemas.microsoft.com/office/drawing/2014/main" id="{16D94C35-12BA-461F-B052-8CCBD2F0DCA2}"/>
+                  </a:ext>
+                </a:extLst>
+              </p:cNvPr>
+              <p:cNvSpPr txBox="1"/>
+              <p:nvPr/>
+            </p:nvSpPr>
+            <p:spPr>
+              <a:xfrm>
+                <a:off x="4744147" y="1704203"/>
+                <a:ext cx="2023354" cy="369332"/>
+              </a:xfrm>
+              <a:prstGeom prst="rect">
+                <a:avLst/>
+              </a:prstGeom>
+              <a:noFill/>
+            </p:spPr>
+            <p:txBody>
+              <a:bodyPr wrap="square">
+                <a:spAutoFit/>
+              </a:bodyPr>
+              <a:lstStyle/>
+              <a:p>
+                <a:r>
+                  <a:rPr lang="en-US" altLang="zh-CN"/>
+                  <a:t>Deterministic</a:t>
+                </a:r>
+                <a:endParaRPr lang="zh-CN" altLang="en-US"/>
+              </a:p>
+            </p:txBody>
+          </p:sp>
+        </p:grpSp>
+        <p:sp>
+          <p:nvSpPr>
+            <p:cNvPr id="90" name="TextBox 89">
+              <a:extLst>
+                <a:ext uri="{FF2B5EF4-FFF2-40B4-BE49-F238E27FC236}">
+                  <a16:creationId xmlns:a16="http://schemas.microsoft.com/office/drawing/2014/main" id="{BC053599-2D90-41E6-B3B3-CB5E5FDA69E6}"/>
+                </a:ext>
+              </a:extLst>
+            </p:cNvPr>
+            <p:cNvSpPr txBox="1"/>
+            <p:nvPr/>
+          </p:nvSpPr>
+          <p:spPr>
+            <a:xfrm>
+              <a:off x="6344927" y="1076159"/>
+              <a:ext cx="3132811" cy="400110"/>
+            </a:xfrm>
+            <a:prstGeom prst="rect">
+              <a:avLst/>
+            </a:prstGeom>
+            <a:noFill/>
+          </p:spPr>
+          <p:txBody>
+            <a:bodyPr wrap="square">
+              <a:spAutoFit/>
+            </a:bodyPr>
+            <a:lstStyle/>
+            <a:p>
+              <a:pPr algn="ctr"/>
+              <a:r>
+                <a:rPr lang="en-US" altLang="zh-CN" sz="2000"/>
+                <a:t>Stochastic Layer </a:t>
+              </a:r>
+              <a:endParaRPr lang="zh-CN" altLang="en-US" sz="2000"/>
+            </a:p>
+          </p:txBody>
+        </p:sp>
+        <p:grpSp>
+          <p:nvGrpSpPr>
+            <p:cNvPr id="94" name="Group 93">
+              <a:extLst>
+                <a:ext uri="{FF2B5EF4-FFF2-40B4-BE49-F238E27FC236}">
+                  <a16:creationId xmlns:a16="http://schemas.microsoft.com/office/drawing/2014/main" id="{72EE4975-D5AF-431C-B428-C29D7468BF16}"/>
+                </a:ext>
+              </a:extLst>
+            </p:cNvPr>
+            <p:cNvGrpSpPr/>
+            <p:nvPr/>
+          </p:nvGrpSpPr>
+          <p:grpSpPr>
+            <a:xfrm>
+              <a:off x="1913907" y="3846068"/>
+              <a:ext cx="2089000" cy="879988"/>
+              <a:chOff x="1925960" y="1826476"/>
+              <a:chExt cx="2089000" cy="879988"/>
+            </a:xfrm>
+          </p:grpSpPr>
+          <p:sp>
+            <p:nvSpPr>
+              <p:cNvPr id="95" name="Rectangle: Rounded Corners 94">
+                <a:extLst>
+                  <a:ext uri="{FF2B5EF4-FFF2-40B4-BE49-F238E27FC236}">
+                    <a16:creationId xmlns:a16="http://schemas.microsoft.com/office/drawing/2014/main" id="{0A81DDE5-A9F0-4C7A-BFF6-7BA86A152F1E}"/>
+                  </a:ext>
+                </a:extLst>
+              </p:cNvPr>
+              <p:cNvSpPr/>
+              <p:nvPr/>
+            </p:nvSpPr>
+            <p:spPr>
+              <a:xfrm>
+                <a:off x="1925960" y="1826476"/>
+                <a:ext cx="2089000" cy="879988"/>
+              </a:xfrm>
+              <a:prstGeom prst="roundRect">
+                <a:avLst>
+                  <a:gd name="adj" fmla="val 13263"/>
+                </a:avLst>
+              </a:prstGeom>
+              <a:solidFill>
+                <a:schemeClr val="accent5">
+                  <a:alpha val="60000"/>
+                </a:schemeClr>
+              </a:solidFill>
+              <a:ln w="19050">
+                <a:solidFill>
+                  <a:schemeClr val="tx1"/>
+                </a:solidFill>
+              </a:ln>
+            </p:spPr>
+            <p:style>
+              <a:lnRef idx="2">
+                <a:schemeClr val="accent1">
+                  <a:shade val="50000"/>
+                </a:schemeClr>
+              </a:lnRef>
+              <a:fillRef idx="1">
+                <a:schemeClr val="accent1"/>
+              </a:fillRef>
+              <a:effectRef idx="0">
+                <a:schemeClr val="accent1"/>
+              </a:effectRef>
+              <a:fontRef idx="minor">
+                <a:schemeClr val="lt1"/>
+              </a:fontRef>
+            </p:style>
+            <p:txBody>
+              <a:bodyPr rtlCol="0" anchor="ctr"/>
+              <a:lstStyle/>
+              <a:p>
+                <a:pPr algn="ctr"/>
+                <a:endParaRPr lang="zh-CN" altLang="en-US"/>
+              </a:p>
+            </p:txBody>
+          </p:sp>
+          <p:sp>
+            <p:nvSpPr>
+              <p:cNvPr id="96" name="Rectangle: Rounded Corners 95">
+                <a:extLst>
+                  <a:ext uri="{FF2B5EF4-FFF2-40B4-BE49-F238E27FC236}">
+                    <a16:creationId xmlns:a16="http://schemas.microsoft.com/office/drawing/2014/main" id="{188F3BC4-60F4-4320-84C0-75E04DA176B7}"/>
+                  </a:ext>
+                </a:extLst>
+              </p:cNvPr>
+              <p:cNvSpPr/>
+              <p:nvPr/>
+            </p:nvSpPr>
+            <p:spPr>
+              <a:xfrm>
+                <a:off x="2086794" y="1914319"/>
+                <a:ext cx="1753602" cy="283316"/>
+              </a:xfrm>
+              <a:prstGeom prst="roundRect">
+                <a:avLst>
+                  <a:gd name="adj" fmla="val 13263"/>
+                </a:avLst>
+              </a:prstGeom>
+              <a:solidFill>
+                <a:schemeClr val="accent2">
+                  <a:alpha val="60000"/>
+                </a:schemeClr>
+              </a:solidFill>
+              <a:ln w="19050">
+                <a:solidFill>
+                  <a:schemeClr val="tx1"/>
+                </a:solidFill>
+              </a:ln>
+            </p:spPr>
+            <p:style>
+              <a:lnRef idx="2">
+                <a:schemeClr val="accent1">
+                  <a:shade val="50000"/>
+                </a:schemeClr>
+              </a:lnRef>
+              <a:fillRef idx="1">
+                <a:schemeClr val="accent1"/>
+              </a:fillRef>
+              <a:effectRef idx="0">
+                <a:schemeClr val="accent1"/>
+              </a:effectRef>
+              <a:fontRef idx="minor">
+                <a:schemeClr val="lt1"/>
+              </a:fontRef>
+            </p:style>
+            <p:txBody>
+              <a:bodyPr rtlCol="0" anchor="ctr"/>
+              <a:lstStyle/>
+              <a:p>
+                <a:pPr algn="ctr"/>
+                <a:r>
+                  <a:rPr lang="en-US" altLang="zh-CN">
+                    <a:solidFill>
+                      <a:schemeClr val="tx1"/>
+                    </a:solidFill>
+                  </a:rPr>
+                  <a:t>Det. Compo</a:t>
+                </a:r>
+                <a:endParaRPr lang="zh-CN" altLang="en-US">
+                  <a:solidFill>
+                    <a:schemeClr val="tx1"/>
+                  </a:solidFill>
+                </a:endParaRPr>
+              </a:p>
+            </p:txBody>
+          </p:sp>
+          <p:sp>
+            <p:nvSpPr>
+              <p:cNvPr id="97" name="Rectangle: Rounded Corners 96">
+                <a:extLst>
+                  <a:ext uri="{FF2B5EF4-FFF2-40B4-BE49-F238E27FC236}">
+                    <a16:creationId xmlns:a16="http://schemas.microsoft.com/office/drawing/2014/main" id="{90029D66-BD35-47F2-AA45-AAFD53978083}"/>
+                  </a:ext>
+                </a:extLst>
+              </p:cNvPr>
+              <p:cNvSpPr/>
+              <p:nvPr/>
+            </p:nvSpPr>
+            <p:spPr>
+              <a:xfrm>
+                <a:off x="2081606" y="2335305"/>
+                <a:ext cx="1753602" cy="283316"/>
+              </a:xfrm>
+              <a:prstGeom prst="roundRect">
+                <a:avLst>
+                  <a:gd name="adj" fmla="val 13263"/>
+                </a:avLst>
+              </a:prstGeom>
+              <a:solidFill>
+                <a:schemeClr val="accent6">
+                  <a:alpha val="60000"/>
+                </a:schemeClr>
+              </a:solidFill>
+              <a:ln w="19050">
+                <a:solidFill>
+                  <a:schemeClr val="tx1"/>
+                </a:solidFill>
+              </a:ln>
+            </p:spPr>
+            <p:style>
+              <a:lnRef idx="2">
+                <a:schemeClr val="accent1">
+                  <a:shade val="50000"/>
+                </a:schemeClr>
+              </a:lnRef>
+              <a:fillRef idx="1">
+                <a:schemeClr val="accent1"/>
+              </a:fillRef>
+              <a:effectRef idx="0">
+                <a:schemeClr val="accent1"/>
+              </a:effectRef>
+              <a:fontRef idx="minor">
+                <a:schemeClr val="lt1"/>
+              </a:fontRef>
+            </p:style>
+            <p:txBody>
+              <a:bodyPr rtlCol="0" anchor="ctr"/>
+              <a:lstStyle/>
+              <a:p>
+                <a:pPr algn="ctr"/>
+                <a:r>
+                  <a:rPr lang="en-US" altLang="zh-CN">
+                    <a:solidFill>
+                      <a:schemeClr val="tx1"/>
+                    </a:solidFill>
+                  </a:rPr>
+                  <a:t>Base + NF</a:t>
+                </a:r>
+                <a:endParaRPr lang="zh-CN" altLang="en-US">
+                  <a:solidFill>
+                    <a:schemeClr val="tx1"/>
+                  </a:solidFill>
+                </a:endParaRPr>
+              </a:p>
+            </p:txBody>
+          </p:sp>
+        </p:grpSp>
+        <p:grpSp>
+          <p:nvGrpSpPr>
+            <p:cNvPr id="14" name="Group 13">
+              <a:extLst>
+                <a:ext uri="{FF2B5EF4-FFF2-40B4-BE49-F238E27FC236}">
+                  <a16:creationId xmlns:a16="http://schemas.microsoft.com/office/drawing/2014/main" id="{DAA90ADA-D565-4834-BCF1-1AAEF5F9F7F7}"/>
+                </a:ext>
+              </a:extLst>
+            </p:cNvPr>
+            <p:cNvGrpSpPr/>
+            <p:nvPr/>
+          </p:nvGrpSpPr>
+          <p:grpSpPr>
+            <a:xfrm>
+              <a:off x="4451242" y="3625271"/>
+              <a:ext cx="6920180" cy="1310523"/>
+              <a:chOff x="4417736" y="3694754"/>
+              <a:chExt cx="6920180" cy="1310523"/>
+            </a:xfrm>
+          </p:grpSpPr>
+          <p:sp>
+            <p:nvSpPr>
+              <p:cNvPr id="39" name="Rectangle: Rounded Corners 38">
+                <a:extLst>
+                  <a:ext uri="{FF2B5EF4-FFF2-40B4-BE49-F238E27FC236}">
+                    <a16:creationId xmlns:a16="http://schemas.microsoft.com/office/drawing/2014/main" id="{AE685C85-FAC6-400F-919D-FE52346D1E0A}"/>
+                  </a:ext>
+                </a:extLst>
+              </p:cNvPr>
+              <p:cNvSpPr/>
+              <p:nvPr/>
+            </p:nvSpPr>
+            <p:spPr>
+              <a:xfrm>
+                <a:off x="4452980" y="3694754"/>
+                <a:ext cx="6884936" cy="1310523"/>
+              </a:xfrm>
+              <a:prstGeom prst="roundRect">
+                <a:avLst>
+                  <a:gd name="adj" fmla="val 13263"/>
+                </a:avLst>
+              </a:prstGeom>
+              <a:solidFill>
+                <a:schemeClr val="accent6">
+                  <a:alpha val="60000"/>
+                </a:schemeClr>
+              </a:solidFill>
+              <a:ln w="19050">
+                <a:solidFill>
+                  <a:schemeClr val="tx1"/>
+                </a:solidFill>
+              </a:ln>
+            </p:spPr>
+            <p:style>
+              <a:lnRef idx="2">
+                <a:schemeClr val="accent1">
+                  <a:shade val="50000"/>
+                </a:schemeClr>
+              </a:lnRef>
+              <a:fillRef idx="1">
+                <a:schemeClr val="accent1"/>
+              </a:fillRef>
+              <a:effectRef idx="0">
+                <a:schemeClr val="accent1"/>
+              </a:effectRef>
+              <a:fontRef idx="minor">
+                <a:schemeClr val="lt1"/>
+              </a:fontRef>
+            </p:style>
+            <p:txBody>
+              <a:bodyPr rtlCol="0" anchor="ctr"/>
+              <a:lstStyle/>
+              <a:p>
+                <a:pPr algn="ctr"/>
+                <a:endParaRPr lang="zh-CN" altLang="en-US"/>
+              </a:p>
+            </p:txBody>
+          </p:sp>
+          <p:grpSp>
+            <p:nvGrpSpPr>
+              <p:cNvPr id="13" name="Group 12">
+                <a:extLst>
+                  <a:ext uri="{FF2B5EF4-FFF2-40B4-BE49-F238E27FC236}">
+                    <a16:creationId xmlns:a16="http://schemas.microsoft.com/office/drawing/2014/main" id="{8AC084A3-0F08-40D2-B06C-CC30D5EF0AF3}"/>
+                  </a:ext>
+                </a:extLst>
+              </p:cNvPr>
+              <p:cNvGrpSpPr/>
+              <p:nvPr/>
+            </p:nvGrpSpPr>
+            <p:grpSpPr>
+              <a:xfrm>
+                <a:off x="4417736" y="4026850"/>
+                <a:ext cx="6920180" cy="646331"/>
+                <a:chOff x="4417736" y="3957366"/>
+                <a:chExt cx="6920180" cy="646331"/>
+              </a:xfrm>
+            </p:grpSpPr>
+            <p:sp>
+              <p:nvSpPr>
+                <p:cNvPr id="40" name="TextBox 39">
+                  <a:extLst>
+                    <a:ext uri="{FF2B5EF4-FFF2-40B4-BE49-F238E27FC236}">
+                      <a16:creationId xmlns:a16="http://schemas.microsoft.com/office/drawing/2014/main" id="{D931E03D-5E32-4B9A-81C2-EA28776D2801}"/>
+                    </a:ext>
+                  </a:extLst>
+                </p:cNvPr>
+                <p:cNvSpPr txBox="1"/>
+                <p:nvPr/>
+              </p:nvSpPr>
+              <p:spPr>
+                <a:xfrm>
+                  <a:off x="4417736" y="4095865"/>
+                  <a:ext cx="1319336" cy="369332"/>
+                </a:xfrm>
+                <a:prstGeom prst="rect">
+                  <a:avLst/>
+                </a:prstGeom>
+                <a:noFill/>
+              </p:spPr>
+              <p:txBody>
+                <a:bodyPr wrap="square">
+                  <a:spAutoFit/>
+                </a:bodyPr>
+                <a:lstStyle/>
+                <a:p>
+                  <a:pPr algn="ctr"/>
+                  <a:r>
+                    <a:rPr lang="en-US" altLang="zh-CN" dirty="0"/>
+                    <a:t>samples</a:t>
+                  </a:r>
+                  <a:endParaRPr lang="zh-CN" altLang="en-US"/>
+                </a:p>
+              </p:txBody>
+            </p:sp>
+            <p:sp>
+              <p:nvSpPr>
+                <p:cNvPr id="41" name="TextBox 40">
+                  <a:extLst>
+                    <a:ext uri="{FF2B5EF4-FFF2-40B4-BE49-F238E27FC236}">
+                      <a16:creationId xmlns:a16="http://schemas.microsoft.com/office/drawing/2014/main" id="{97E2B64B-AEE5-46FE-BE8A-D7E2E6D68732}"/>
+                    </a:ext>
+                  </a:extLst>
+                </p:cNvPr>
+                <p:cNvSpPr txBox="1"/>
+                <p:nvPr/>
+              </p:nvSpPr>
+              <p:spPr>
+                <a:xfrm>
+                  <a:off x="9982200" y="3957366"/>
+                  <a:ext cx="1355716" cy="646331"/>
+                </a:xfrm>
+                <a:prstGeom prst="rect">
+                  <a:avLst/>
+                </a:prstGeom>
+                <a:noFill/>
+              </p:spPr>
+              <p:txBody>
+                <a:bodyPr wrap="square">
+                  <a:spAutoFit/>
+                </a:bodyPr>
+                <a:lstStyle/>
+                <a:p>
+                  <a:r>
+                    <a:rPr lang="en-US" altLang="zh-CN" dirty="0"/>
+                    <a:t>transformed </a:t>
+                  </a:r>
+                </a:p>
+                <a:p>
+                  <a:r>
+                    <a:rPr lang="en-US" altLang="zh-CN" dirty="0"/>
+                    <a:t>samples</a:t>
+                  </a:r>
+                </a:p>
+              </p:txBody>
+            </p:sp>
+            <p:grpSp>
+              <p:nvGrpSpPr>
+                <p:cNvPr id="12" name="Group 11">
+                  <a:extLst>
+                    <a:ext uri="{FF2B5EF4-FFF2-40B4-BE49-F238E27FC236}">
+                      <a16:creationId xmlns:a16="http://schemas.microsoft.com/office/drawing/2014/main" id="{0646CBA7-1240-4ADC-B7A2-10861141A9E0}"/>
+                    </a:ext>
+                  </a:extLst>
+                </p:cNvPr>
+                <p:cNvGrpSpPr/>
+                <p:nvPr/>
+              </p:nvGrpSpPr>
+              <p:grpSpPr>
+                <a:xfrm>
+                  <a:off x="5548985" y="4011114"/>
+                  <a:ext cx="1474634" cy="538835"/>
+                  <a:chOff x="5548985" y="4026578"/>
+                  <a:chExt cx="1474634" cy="538835"/>
+                </a:xfrm>
+              </p:grpSpPr>
+              <p:sp>
+                <p:nvSpPr>
+                  <p:cNvPr id="42" name="Rectangle 41">
+                    <a:extLst>
+                      <a:ext uri="{FF2B5EF4-FFF2-40B4-BE49-F238E27FC236}">
+                        <a16:creationId xmlns:a16="http://schemas.microsoft.com/office/drawing/2014/main" id="{AA0C8FD7-010A-48B7-8504-AD8631D011D8}"/>
+                      </a:ext>
+                    </a:extLst>
+                  </p:cNvPr>
+                  <p:cNvSpPr/>
+                  <p:nvPr/>
+                </p:nvSpPr>
+                <p:spPr>
+                  <a:xfrm>
+                    <a:off x="5840907" y="4026578"/>
+                    <a:ext cx="881441" cy="538835"/>
+                  </a:xfrm>
+                  <a:prstGeom prst="rect">
+                    <a:avLst/>
+                  </a:prstGeom>
+                  <a:solidFill>
+                    <a:schemeClr val="bg2">
+                      <a:alpha val="60000"/>
+                    </a:schemeClr>
+                  </a:solidFill>
+                  <a:ln w="19050"/>
+                </p:spPr>
+                <p:style>
+                  <a:lnRef idx="2">
+                    <a:schemeClr val="dk1"/>
+                  </a:lnRef>
+                  <a:fillRef idx="1">
+                    <a:schemeClr val="lt1"/>
+                  </a:fillRef>
+                  <a:effectRef idx="0">
+                    <a:schemeClr val="dk1"/>
+                  </a:effectRef>
+                  <a:fontRef idx="minor">
+                    <a:schemeClr val="dk1"/>
+                  </a:fontRef>
+                </p:style>
+                <p:txBody>
+                  <a:bodyPr rtlCol="0" anchor="ctr"/>
+                  <a:lstStyle/>
+                  <a:p>
+                    <a:pPr algn="ctr"/>
+                    <a:r>
+                      <a:rPr lang="en-US" altLang="zh-CN"/>
+                      <a:t>Flow Layer</a:t>
+                    </a:r>
+                    <a:endParaRPr lang="zh-CN" altLang="en-US"/>
+                  </a:p>
+                </p:txBody>
+              </p:sp>
+              <p:cxnSp>
+                <p:nvCxnSpPr>
+                  <p:cNvPr id="43" name="Straight Arrow Connector 42">
+                    <a:extLst>
+                      <a:ext uri="{FF2B5EF4-FFF2-40B4-BE49-F238E27FC236}">
+                        <a16:creationId xmlns:a16="http://schemas.microsoft.com/office/drawing/2014/main" id="{9DA56484-6B3E-4504-B9AC-B662EC17A5DC}"/>
+                      </a:ext>
+                    </a:extLst>
+                  </p:cNvPr>
+                  <p:cNvCxnSpPr>
+                    <a:cxnSpLocks/>
+                  </p:cNvCxnSpPr>
+                  <p:nvPr/>
+                </p:nvCxnSpPr>
+                <p:spPr>
+                  <a:xfrm>
+                    <a:off x="6731697" y="4295995"/>
+                    <a:ext cx="291922" cy="0"/>
+                  </a:xfrm>
+                  <a:prstGeom prst="straightConnector1">
+                    <a:avLst/>
+                  </a:prstGeom>
+                  <a:ln w="19050">
+                    <a:solidFill>
+                      <a:schemeClr val="tx1"/>
+                    </a:solidFill>
+                    <a:tailEnd type="triangle"/>
+                  </a:ln>
+                </p:spPr>
+                <p:style>
+                  <a:lnRef idx="1">
+                    <a:schemeClr val="accent1"/>
+                  </a:lnRef>
+                  <a:fillRef idx="0">
+                    <a:schemeClr val="accent1"/>
+                  </a:fillRef>
+                  <a:effectRef idx="0">
+                    <a:schemeClr val="accent1"/>
+                  </a:effectRef>
+                  <a:fontRef idx="minor">
+                    <a:schemeClr val="tx1"/>
+                  </a:fontRef>
+                </p:style>
+              </p:cxnSp>
+              <p:cxnSp>
+                <p:nvCxnSpPr>
+                  <p:cNvPr id="45" name="Straight Arrow Connector 44">
+                    <a:extLst>
+                      <a:ext uri="{FF2B5EF4-FFF2-40B4-BE49-F238E27FC236}">
+                        <a16:creationId xmlns:a16="http://schemas.microsoft.com/office/drawing/2014/main" id="{611BFA99-0B0F-4FE6-869C-B655E4398AC8}"/>
+                      </a:ext>
+                    </a:extLst>
+                  </p:cNvPr>
+                  <p:cNvCxnSpPr>
+                    <a:cxnSpLocks/>
+                  </p:cNvCxnSpPr>
+                  <p:nvPr/>
+                </p:nvCxnSpPr>
+                <p:spPr>
+                  <a:xfrm>
+                    <a:off x="5548985" y="4295995"/>
+                    <a:ext cx="291922" cy="0"/>
+                  </a:xfrm>
+                  <a:prstGeom prst="straightConnector1">
+                    <a:avLst/>
+                  </a:prstGeom>
+                  <a:ln w="19050">
+                    <a:solidFill>
+                      <a:schemeClr val="tx1"/>
+                    </a:solidFill>
+                    <a:tailEnd type="triangle"/>
+                  </a:ln>
+                </p:spPr>
+                <p:style>
+                  <a:lnRef idx="1">
+                    <a:schemeClr val="accent1"/>
+                  </a:lnRef>
+                  <a:fillRef idx="0">
+                    <a:schemeClr val="accent1"/>
+                  </a:fillRef>
+                  <a:effectRef idx="0">
+                    <a:schemeClr val="accent1"/>
+                  </a:effectRef>
+                  <a:fontRef idx="minor">
+                    <a:schemeClr val="tx1"/>
+                  </a:fontRef>
+                </p:style>
+              </p:cxnSp>
+            </p:grpSp>
+            <mc:AlternateContent xmlns:mc="http://schemas.openxmlformats.org/markup-compatibility/2006" xmlns:a14="http://schemas.microsoft.com/office/drawing/2010/main">
+              <mc:Choice Requires="a14">
+                <p:sp>
+                  <p:nvSpPr>
+                    <p:cNvPr id="47" name="TextBox 46">
+                      <a:extLst>
+                        <a:ext uri="{FF2B5EF4-FFF2-40B4-BE49-F238E27FC236}">
+                          <a16:creationId xmlns:a16="http://schemas.microsoft.com/office/drawing/2014/main" id="{CC91445E-A303-4805-B970-F7CA60818D8F}"/>
+                        </a:ext>
+                      </a:extLst>
+                    </p:cNvPr>
+                    <p:cNvSpPr txBox="1"/>
+                    <p:nvPr/>
+                  </p:nvSpPr>
+                  <p:spPr>
+                    <a:xfrm>
+                      <a:off x="7023379" y="4116110"/>
+                      <a:ext cx="254878" cy="276999"/>
+                    </a:xfrm>
+                    <a:prstGeom prst="rect">
+                      <a:avLst/>
+                    </a:prstGeom>
+                    <a:noFill/>
+                  </p:spPr>
+                  <p:txBody>
+                    <a:bodyPr wrap="none" lIns="0" tIns="0" rIns="0" bIns="0" rtlCol="0">
+                      <a:spAutoFit/>
+                    </a:bodyPr>
+                    <a:lstStyle/>
+                    <a:p>
+                      <a:pPr/>
+                      <a14:m>
+                        <m:oMathPara xmlns:m="http://schemas.openxmlformats.org/officeDocument/2006/math">
+                          <m:oMathParaPr>
+                            <m:jc m:val="centerGroup"/>
+                          </m:oMathParaPr>
+                          <m:oMath xmlns:m="http://schemas.openxmlformats.org/officeDocument/2006/math">
+                            <m:r>
+                              <a:rPr lang="zh-CN" altLang="en-US" i="1" smtClean="0">
+                                <a:latin typeface="Cambria Math" panose="02040503050406030204" pitchFamily="18" charset="0"/>
+                              </a:rPr>
+                              <m:t>⋯</m:t>
+                            </m:r>
+                          </m:oMath>
+                        </m:oMathPara>
+                      </a14:m>
+                      <a:endParaRPr lang="zh-CN" altLang="en-US"/>
+                    </a:p>
+                  </p:txBody>
+                </p:sp>
+              </mc:Choice>
+              <mc:Fallback xmlns="">
+                <p:sp>
+                  <p:nvSpPr>
+                    <p:cNvPr id="47" name="TextBox 46">
+                      <a:extLst>
+                        <a:ext uri="{FF2B5EF4-FFF2-40B4-BE49-F238E27FC236}">
+                          <a16:creationId xmlns:a16="http://schemas.microsoft.com/office/drawing/2014/main" id="{CC91445E-A303-4805-B970-F7CA60818D8F}"/>
+                        </a:ext>
+                      </a:extLst>
+                    </p:cNvPr>
+                    <p:cNvSpPr txBox="1">
+                      <a:spLocks noRot="1" noChangeAspect="1" noMove="1" noResize="1" noEditPoints="1" noAdjustHandles="1" noChangeArrowheads="1" noChangeShapeType="1" noTextEdit="1"/>
+                    </p:cNvSpPr>
+                    <p:nvPr/>
+                  </p:nvSpPr>
+                  <p:spPr>
+                    <a:xfrm>
+                      <a:off x="7023379" y="4116110"/>
+                      <a:ext cx="254878" cy="276999"/>
+                    </a:xfrm>
+                    <a:prstGeom prst="rect">
+                      <a:avLst/>
+                    </a:prstGeom>
+                    <a:blipFill>
+                      <a:blip r:embed="rId5"/>
+                      <a:stretch>
+                        <a:fillRect l="-4878" r="-9756"/>
+                      </a:stretch>
+                    </a:blipFill>
+                  </p:spPr>
+                  <p:txBody>
+                    <a:bodyPr/>
+                    <a:lstStyle/>
+                    <a:p>
+                      <a:r>
+                        <a:rPr lang="zh-CN" altLang="en-US">
+                          <a:noFill/>
+                        </a:rPr>
+                        <a:t> </a:t>
+                      </a:r>
+                    </a:p>
+                  </p:txBody>
+                </p:sp>
+              </mc:Fallback>
+            </mc:AlternateContent>
+            <p:grpSp>
+              <p:nvGrpSpPr>
+                <p:cNvPr id="58" name="Group 57">
+                  <a:extLst>
+                    <a:ext uri="{FF2B5EF4-FFF2-40B4-BE49-F238E27FC236}">
+                      <a16:creationId xmlns:a16="http://schemas.microsoft.com/office/drawing/2014/main" id="{C675A48F-F560-4312-BCC4-DBE2AE8522BE}"/>
+                    </a:ext>
+                  </a:extLst>
+                </p:cNvPr>
+                <p:cNvGrpSpPr/>
+                <p:nvPr/>
+              </p:nvGrpSpPr>
+              <p:grpSpPr>
+                <a:xfrm>
+                  <a:off x="8519595" y="4011114"/>
+                  <a:ext cx="1474634" cy="538835"/>
+                  <a:chOff x="5548985" y="4026578"/>
+                  <a:chExt cx="1474634" cy="538835"/>
+                </a:xfrm>
+              </p:grpSpPr>
+              <p:sp>
+                <p:nvSpPr>
+                  <p:cNvPr id="59" name="Rectangle 58">
+                    <a:extLst>
+                      <a:ext uri="{FF2B5EF4-FFF2-40B4-BE49-F238E27FC236}">
+                        <a16:creationId xmlns:a16="http://schemas.microsoft.com/office/drawing/2014/main" id="{2190FD81-7A71-4C9B-8B75-B7D33DFE6A95}"/>
+                      </a:ext>
+                    </a:extLst>
+                  </p:cNvPr>
+                  <p:cNvSpPr/>
+                  <p:nvPr/>
+                </p:nvSpPr>
+                <p:spPr>
+                  <a:xfrm>
+                    <a:off x="5840907" y="4026578"/>
+                    <a:ext cx="881441" cy="538835"/>
+                  </a:xfrm>
+                  <a:prstGeom prst="rect">
+                    <a:avLst/>
+                  </a:prstGeom>
+                  <a:solidFill>
+                    <a:schemeClr val="bg2">
+                      <a:alpha val="60000"/>
+                    </a:schemeClr>
+                  </a:solidFill>
+                  <a:ln w="19050"/>
+                </p:spPr>
+                <p:style>
+                  <a:lnRef idx="2">
+                    <a:schemeClr val="dk1"/>
+                  </a:lnRef>
+                  <a:fillRef idx="1">
+                    <a:schemeClr val="lt1"/>
+                  </a:fillRef>
+                  <a:effectRef idx="0">
+                    <a:schemeClr val="dk1"/>
+                  </a:effectRef>
+                  <a:fontRef idx="minor">
+                    <a:schemeClr val="dk1"/>
+                  </a:fontRef>
+                </p:style>
+                <p:txBody>
+                  <a:bodyPr rtlCol="0" anchor="ctr"/>
+                  <a:lstStyle/>
+                  <a:p>
+                    <a:pPr algn="ctr"/>
+                    <a:r>
+                      <a:rPr lang="en-US" altLang="zh-CN"/>
+                      <a:t>Flow Layer</a:t>
+                    </a:r>
+                    <a:endParaRPr lang="zh-CN" altLang="en-US"/>
+                  </a:p>
+                </p:txBody>
+              </p:sp>
+              <p:cxnSp>
+                <p:nvCxnSpPr>
+                  <p:cNvPr id="60" name="Straight Arrow Connector 59">
+                    <a:extLst>
+                      <a:ext uri="{FF2B5EF4-FFF2-40B4-BE49-F238E27FC236}">
+                        <a16:creationId xmlns:a16="http://schemas.microsoft.com/office/drawing/2014/main" id="{F156658C-C253-40C1-9780-EB7E5D0AA9BA}"/>
+                      </a:ext>
+                    </a:extLst>
+                  </p:cNvPr>
+                  <p:cNvCxnSpPr>
+                    <a:cxnSpLocks/>
+                  </p:cNvCxnSpPr>
+                  <p:nvPr/>
+                </p:nvCxnSpPr>
+                <p:spPr>
+                  <a:xfrm>
+                    <a:off x="6731697" y="4295995"/>
+                    <a:ext cx="291922" cy="0"/>
+                  </a:xfrm>
+                  <a:prstGeom prst="straightConnector1">
+                    <a:avLst/>
+                  </a:prstGeom>
+                  <a:ln w="19050">
+                    <a:solidFill>
+                      <a:schemeClr val="tx1"/>
+                    </a:solidFill>
+                    <a:tailEnd type="triangle"/>
+                  </a:ln>
+                </p:spPr>
+                <p:style>
+                  <a:lnRef idx="1">
+                    <a:schemeClr val="accent1"/>
+                  </a:lnRef>
+                  <a:fillRef idx="0">
+                    <a:schemeClr val="accent1"/>
+                  </a:fillRef>
+                  <a:effectRef idx="0">
+                    <a:schemeClr val="accent1"/>
+                  </a:effectRef>
+                  <a:fontRef idx="minor">
+                    <a:schemeClr val="tx1"/>
+                  </a:fontRef>
+                </p:style>
+              </p:cxnSp>
+              <p:cxnSp>
+                <p:nvCxnSpPr>
+                  <p:cNvPr id="61" name="Straight Arrow Connector 60">
+                    <a:extLst>
+                      <a:ext uri="{FF2B5EF4-FFF2-40B4-BE49-F238E27FC236}">
+                        <a16:creationId xmlns:a16="http://schemas.microsoft.com/office/drawing/2014/main" id="{DB46D9C5-3AB6-4BCA-8291-8D366A310DAC}"/>
+                      </a:ext>
+                    </a:extLst>
+                  </p:cNvPr>
+                  <p:cNvCxnSpPr>
+                    <a:cxnSpLocks/>
+                  </p:cNvCxnSpPr>
+                  <p:nvPr/>
+                </p:nvCxnSpPr>
+                <p:spPr>
+                  <a:xfrm>
+                    <a:off x="5548985" y="4295995"/>
+                    <a:ext cx="291922" cy="0"/>
+                  </a:xfrm>
+                  <a:prstGeom prst="straightConnector1">
+                    <a:avLst/>
+                  </a:prstGeom>
+                  <a:ln w="19050">
+                    <a:solidFill>
+                      <a:schemeClr val="tx1"/>
+                    </a:solidFill>
+                    <a:tailEnd type="triangle"/>
+                  </a:ln>
+                </p:spPr>
+                <p:style>
+                  <a:lnRef idx="1">
+                    <a:schemeClr val="accent1"/>
+                  </a:lnRef>
+                  <a:fillRef idx="0">
+                    <a:schemeClr val="accent1"/>
+                  </a:fillRef>
+                  <a:effectRef idx="0">
+                    <a:schemeClr val="accent1"/>
+                  </a:effectRef>
+                  <a:fontRef idx="minor">
+                    <a:schemeClr val="tx1"/>
+                  </a:fontRef>
+                </p:style>
+              </p:cxnSp>
+            </p:grpSp>
+            <p:grpSp>
+              <p:nvGrpSpPr>
+                <p:cNvPr id="62" name="Group 61">
+                  <a:extLst>
+                    <a:ext uri="{FF2B5EF4-FFF2-40B4-BE49-F238E27FC236}">
+                      <a16:creationId xmlns:a16="http://schemas.microsoft.com/office/drawing/2014/main" id="{781C4B24-BE56-4E66-8B9B-C043A2F3BA19}"/>
+                    </a:ext>
+                  </a:extLst>
+                </p:cNvPr>
+                <p:cNvGrpSpPr/>
+                <p:nvPr/>
+              </p:nvGrpSpPr>
+              <p:grpSpPr>
+                <a:xfrm>
+                  <a:off x="7324650" y="4011114"/>
+                  <a:ext cx="1173363" cy="538835"/>
+                  <a:chOff x="5548985" y="4026578"/>
+                  <a:chExt cx="1173363" cy="538835"/>
+                </a:xfrm>
+              </p:grpSpPr>
+              <p:sp>
+                <p:nvSpPr>
+                  <p:cNvPr id="63" name="Rectangle 62">
+                    <a:extLst>
+                      <a:ext uri="{FF2B5EF4-FFF2-40B4-BE49-F238E27FC236}">
+                        <a16:creationId xmlns:a16="http://schemas.microsoft.com/office/drawing/2014/main" id="{3358F619-0C5D-4E57-B923-6CEFF334E733}"/>
+                      </a:ext>
+                    </a:extLst>
+                  </p:cNvPr>
+                  <p:cNvSpPr/>
+                  <p:nvPr/>
+                </p:nvSpPr>
+                <p:spPr>
+                  <a:xfrm>
+                    <a:off x="5840907" y="4026578"/>
+                    <a:ext cx="881441" cy="538835"/>
+                  </a:xfrm>
+                  <a:prstGeom prst="rect">
+                    <a:avLst/>
+                  </a:prstGeom>
+                  <a:solidFill>
+                    <a:schemeClr val="bg2">
+                      <a:alpha val="60000"/>
+                    </a:schemeClr>
+                  </a:solidFill>
+                  <a:ln w="19050"/>
+                </p:spPr>
+                <p:style>
+                  <a:lnRef idx="2">
+                    <a:schemeClr val="dk1"/>
+                  </a:lnRef>
+                  <a:fillRef idx="1">
+                    <a:schemeClr val="lt1"/>
+                  </a:fillRef>
+                  <a:effectRef idx="0">
+                    <a:schemeClr val="dk1"/>
+                  </a:effectRef>
+                  <a:fontRef idx="minor">
+                    <a:schemeClr val="dk1"/>
+                  </a:fontRef>
+                </p:style>
+                <p:txBody>
+                  <a:bodyPr rtlCol="0" anchor="ctr"/>
+                  <a:lstStyle/>
+                  <a:p>
+                    <a:pPr algn="ctr"/>
+                    <a:r>
+                      <a:rPr lang="en-US" altLang="zh-CN"/>
+                      <a:t>Flow Layer</a:t>
+                    </a:r>
+                    <a:endParaRPr lang="zh-CN" altLang="en-US"/>
+                  </a:p>
+                </p:txBody>
+              </p:sp>
+              <p:cxnSp>
+                <p:nvCxnSpPr>
+                  <p:cNvPr id="65" name="Straight Arrow Connector 64">
+                    <a:extLst>
+                      <a:ext uri="{FF2B5EF4-FFF2-40B4-BE49-F238E27FC236}">
+                        <a16:creationId xmlns:a16="http://schemas.microsoft.com/office/drawing/2014/main" id="{857A3E44-3168-48DB-8777-499681F1CA6B}"/>
+                      </a:ext>
+                    </a:extLst>
+                  </p:cNvPr>
+                  <p:cNvCxnSpPr>
+                    <a:cxnSpLocks/>
+                  </p:cNvCxnSpPr>
+                  <p:nvPr/>
+                </p:nvCxnSpPr>
+                <p:spPr>
+                  <a:xfrm>
+                    <a:off x="5548985" y="4295995"/>
+                    <a:ext cx="291922" cy="0"/>
+                  </a:xfrm>
+                  <a:prstGeom prst="straightConnector1">
+                    <a:avLst/>
+                  </a:prstGeom>
+                  <a:ln w="19050">
+                    <a:solidFill>
+                      <a:schemeClr val="tx1"/>
+                    </a:solidFill>
+                    <a:tailEnd type="triangle"/>
+                  </a:ln>
+                </p:spPr>
+                <p:style>
+                  <a:lnRef idx="1">
+                    <a:schemeClr val="accent1"/>
+                  </a:lnRef>
+                  <a:fillRef idx="0">
+                    <a:schemeClr val="accent1"/>
+                  </a:fillRef>
+                  <a:effectRef idx="0">
+                    <a:schemeClr val="accent1"/>
+                  </a:effectRef>
+                  <a:fontRef idx="minor">
+                    <a:schemeClr val="tx1"/>
+                  </a:fontRef>
+                </p:style>
+              </p:cxnSp>
+            </p:grpSp>
+          </p:grpSp>
+        </p:grpSp>
+      </p:grpSp>
+    </p:spTree>
+    <p:extLst>
+      <p:ext uri="{BB962C8B-B14F-4D97-AF65-F5344CB8AC3E}">
+        <p14:creationId xmlns:p14="http://schemas.microsoft.com/office/powerpoint/2010/main" val="532414677"/>
+      </p:ext>
+    </p:extLst>
+  </p:cSld>
+  <p:clrMapOvr>
+    <a:masterClrMapping/>
+  </p:clrMapOvr>
+</p:sld>
+</file>
+
 <file path=ppt/slides/slide2.xml><?xml version="1.0" encoding="utf-8"?>
 <p:sld xmlns:a="http://schemas.openxmlformats.org/drawingml/2006/main" xmlns:r="http://schemas.openxmlformats.org/officeDocument/2006/relationships" xmlns:p="http://schemas.openxmlformats.org/presentationml/2006/main">
   <p:cSld>
@@ -12244,7 +14982,7 @@
           <a:p>
             <a:fld id="{7759A32C-784D-4C90-A57A-523B08FB85CB}" type="datetime1">
               <a:rPr lang="zh-CN" altLang="en-US" smtClean="0"/>
-              <a:t>2021/8/24</a:t>
+              <a:t>2021/9/26</a:t>
             </a:fld>
             <a:endParaRPr lang="zh-CN" altLang="en-US"/>
           </a:p>
@@ -12574,7 +15312,7 @@
           <a:p>
             <a:fld id="{7759A32C-784D-4C90-A57A-523B08FB85CB}" type="datetime1">
               <a:rPr lang="zh-CN" altLang="en-US" smtClean="0"/>
-              <a:t>2021/8/24</a:t>
+              <a:t>2021/9/26</a:t>
             </a:fld>
             <a:endParaRPr lang="zh-CN" altLang="en-US"/>
           </a:p>
@@ -13293,7 +16031,7 @@
           <a:p>
             <a:fld id="{7759A32C-784D-4C90-A57A-523B08FB85CB}" type="datetime1">
               <a:rPr lang="zh-CN" altLang="en-US" smtClean="0"/>
-              <a:t>2021/8/24</a:t>
+              <a:t>2021/9/26</a:t>
             </a:fld>
             <a:endParaRPr lang="zh-CN" altLang="en-US"/>
           </a:p>
@@ -14325,7 +17063,7 @@
           <a:p>
             <a:fld id="{7759A32C-784D-4C90-A57A-523B08FB85CB}" type="datetime1">
               <a:rPr lang="zh-CN" altLang="en-US" smtClean="0"/>
-              <a:t>2021/8/24</a:t>
+              <a:t>2021/9/26</a:t>
             </a:fld>
             <a:endParaRPr lang="zh-CN" altLang="en-US"/>
           </a:p>
@@ -15876,7 +18614,7 @@
           <a:p>
             <a:fld id="{7759A32C-784D-4C90-A57A-523B08FB85CB}" type="datetime1">
               <a:rPr lang="zh-CN" altLang="en-US" smtClean="0"/>
-              <a:t>2021/8/24</a:t>
+              <a:t>2021/9/26</a:t>
             </a:fld>
             <a:endParaRPr lang="zh-CN" altLang="en-US"/>
           </a:p>
@@ -16031,8 +18769,8 @@
           </a:p>
         </p:txBody>
       </p:sp>
-      <mc:AlternateContent xmlns:mc="http://schemas.openxmlformats.org/markup-compatibility/2006">
-        <mc:Choice xmlns:a14="http://schemas.microsoft.com/office/drawing/2010/main" Requires="a14">
+      <mc:AlternateContent xmlns:mc="http://schemas.openxmlformats.org/markup-compatibility/2006" xmlns:a14="http://schemas.microsoft.com/office/drawing/2010/main">
+        <mc:Choice Requires="a14">
           <p:sp>
             <p:nvSpPr>
               <p:cNvPr id="24" name="文本框 2">
@@ -16385,7 +19123,7 @@
             </p:txBody>
           </p:sp>
         </mc:Choice>
-        <mc:Fallback>
+        <mc:Fallback xmlns="">
           <p:sp>
             <p:nvSpPr>
               <p:cNvPr id="24" name="文本框 2">
@@ -16430,8 +19168,8 @@
           </p:sp>
         </mc:Fallback>
       </mc:AlternateContent>
-      <mc:AlternateContent xmlns:mc="http://schemas.openxmlformats.org/markup-compatibility/2006">
-        <mc:Choice xmlns:a14="http://schemas.microsoft.com/office/drawing/2010/main" Requires="a14">
+      <mc:AlternateContent xmlns:mc="http://schemas.openxmlformats.org/markup-compatibility/2006" xmlns:a14="http://schemas.microsoft.com/office/drawing/2010/main">
+        <mc:Choice Requires="a14">
           <p:sp>
             <p:nvSpPr>
               <p:cNvPr id="23" name="TextBox 22">
@@ -16630,7 +19368,7 @@
             </p:txBody>
           </p:sp>
         </mc:Choice>
-        <mc:Fallback>
+        <mc:Fallback xmlns="">
           <p:sp>
             <p:nvSpPr>
               <p:cNvPr id="23" name="TextBox 22">
@@ -16675,8 +19413,8 @@
           </p:sp>
         </mc:Fallback>
       </mc:AlternateContent>
-      <mc:AlternateContent xmlns:mc="http://schemas.openxmlformats.org/markup-compatibility/2006">
-        <mc:Choice xmlns:a14="http://schemas.microsoft.com/office/drawing/2010/main" Requires="a14">
+      <mc:AlternateContent xmlns:mc="http://schemas.openxmlformats.org/markup-compatibility/2006" xmlns:a14="http://schemas.microsoft.com/office/drawing/2010/main">
+        <mc:Choice Requires="a14">
           <p:sp>
             <p:nvSpPr>
               <p:cNvPr id="28" name="TextBox 27">
@@ -16939,7 +19677,7 @@
             </p:txBody>
           </p:sp>
         </mc:Choice>
-        <mc:Fallback>
+        <mc:Fallback xmlns="">
           <p:sp>
             <p:nvSpPr>
               <p:cNvPr id="28" name="TextBox 27">
@@ -18428,7 +21166,7 @@
           <a:p>
             <a:fld id="{7759A32C-784D-4C90-A57A-523B08FB85CB}" type="datetime1">
               <a:rPr lang="zh-CN" altLang="en-US" smtClean="0"/>
-              <a:t>2021/8/24</a:t>
+              <a:t>2021/9/26</a:t>
             </a:fld>
             <a:endParaRPr lang="zh-CN" altLang="en-US"/>
           </a:p>
@@ -19953,7 +22691,7 @@
           <a:p>
             <a:fld id="{7759A32C-784D-4C90-A57A-523B08FB85CB}" type="datetime1">
               <a:rPr lang="zh-CN" altLang="en-US" smtClean="0"/>
-              <a:t>2021/8/24</a:t>
+              <a:t>2021/9/26</a:t>
             </a:fld>
             <a:endParaRPr lang="zh-CN" altLang="en-US"/>
           </a:p>
@@ -21393,7 +24131,7 @@
           <a:p>
             <a:fld id="{7759A32C-784D-4C90-A57A-523B08FB85CB}" type="datetime1">
               <a:rPr lang="zh-CN" altLang="en-US" smtClean="0"/>
-              <a:t>2021/8/24</a:t>
+              <a:t>2021/9/26</a:t>
             </a:fld>
             <a:endParaRPr lang="zh-CN" altLang="en-US"/>
           </a:p>

</xml_diff>